<commit_message>
Correction de la présentation + MàJ du JdT 26.06.2017
</commit_message>
<xml_diff>
--- a/Documentation/Projet DemoMot.pptx
+++ b/Documentation/Projet DemoMot.pptx
@@ -1,11 +1,11 @@
 
 <file path=ppt/presentation.xml><?xml version="1.0" encoding="utf-8"?>
-<p:presentation xmlns:a="http://schemas.openxmlformats.org/drawingml/2006/main" xmlns:r="http://schemas.openxmlformats.org/officeDocument/2006/relationships" xmlns:p="http://schemas.openxmlformats.org/presentationml/2006/main" autoCompressPictures="0">
+<p:presentation xmlns:a="http://schemas.openxmlformats.org/drawingml/2006/main" xmlns:r="http://schemas.openxmlformats.org/officeDocument/2006/relationships" xmlns:p="http://schemas.openxmlformats.org/presentationml/2006/main" showSpecialPlsOnTitleSld="0" autoCompressPictures="0">
   <p:sldMasterIdLst>
     <p:sldMasterId id="2147483648" r:id="rId1"/>
   </p:sldMasterIdLst>
   <p:notesMasterIdLst>
-    <p:notesMasterId r:id="rId21"/>
+    <p:notesMasterId r:id="rId23"/>
   </p:notesMasterIdLst>
   <p:sldIdLst>
     <p:sldId id="256" r:id="rId2"/>
@@ -24,9 +24,11 @@
     <p:sldId id="263" r:id="rId15"/>
     <p:sldId id="269" r:id="rId16"/>
     <p:sldId id="270" r:id="rId17"/>
-    <p:sldId id="275" r:id="rId18"/>
-    <p:sldId id="265" r:id="rId19"/>
-    <p:sldId id="266" r:id="rId20"/>
+    <p:sldId id="276" r:id="rId18"/>
+    <p:sldId id="277" r:id="rId19"/>
+    <p:sldId id="275" r:id="rId20"/>
+    <p:sldId id="265" r:id="rId21"/>
+    <p:sldId id="266" r:id="rId22"/>
   </p:sldIdLst>
   <p:sldSz cx="12192000" cy="6858000"/>
   <p:notesSz cx="6858000" cy="9144000"/>
@@ -125,6 +127,11 @@
       </a:defRPr>
     </a:lvl9pPr>
   </p:defaultTextStyle>
+  <p:extLst>
+    <p:ext uri="{EFAFB233-063F-42B5-8137-9DF3F51BA10A}">
+      <p15:sldGuideLst xmlns:p15="http://schemas.microsoft.com/office/powerpoint/2012/main"/>
+    </p:ext>
+  </p:extLst>
 </p:presentation>
 </file>
 
@@ -210,7 +217,7 @@
           <a:p>
             <a:fld id="{4AAE513F-EFAF-449F-A4C4-034B81EAB480}" type="datetimeFigureOut">
               <a:rPr lang="fr-CH" smtClean="0"/>
-              <a:t>16.06.2017</a:t>
+              <a:t>26.06.2017</a:t>
             </a:fld>
             <a:endParaRPr lang="fr-CH"/>
           </a:p>
@@ -578,6 +585,98 @@
 </p:notes>
 </file>
 
+<file path=ppt/notesSlides/notesSlide10.xml><?xml version="1.0" encoding="utf-8"?>
+<p:notes xmlns:a="http://schemas.openxmlformats.org/drawingml/2006/main" xmlns:r="http://schemas.openxmlformats.org/officeDocument/2006/relationships" xmlns:p="http://schemas.openxmlformats.org/presentationml/2006/main">
+  <p:cSld>
+    <p:spTree>
+      <p:nvGrpSpPr>
+        <p:cNvPr id="1" name=""/>
+        <p:cNvGrpSpPr/>
+        <p:nvPr/>
+      </p:nvGrpSpPr>
+      <p:grpSpPr>
+        <a:xfrm>
+          <a:off x="0" y="0"/>
+          <a:ext cx="0" cy="0"/>
+          <a:chOff x="0" y="0"/>
+          <a:chExt cx="0" cy="0"/>
+        </a:xfrm>
+      </p:grpSpPr>
+      <p:sp>
+        <p:nvSpPr>
+          <p:cNvPr id="2" name="Espace réservé de l'image des diapositives 1"/>
+          <p:cNvSpPr>
+            <a:spLocks noGrp="1" noRot="1" noChangeAspect="1"/>
+          </p:cNvSpPr>
+          <p:nvPr>
+            <p:ph type="sldImg"/>
+          </p:nvPr>
+        </p:nvSpPr>
+        <p:spPr/>
+      </p:sp>
+      <p:sp>
+        <p:nvSpPr>
+          <p:cNvPr id="3" name="Espace réservé des notes 2"/>
+          <p:cNvSpPr>
+            <a:spLocks noGrp="1"/>
+          </p:cNvSpPr>
+          <p:nvPr>
+            <p:ph type="body" idx="1"/>
+          </p:nvPr>
+        </p:nvSpPr>
+        <p:spPr/>
+        <p:txBody>
+          <a:bodyPr/>
+          <a:lstStyle/>
+          <a:p>
+            <a:r>
+              <a:rPr lang="fr-CH" dirty="0" smtClean="0"/>
+              <a:t>Projet fini ?</a:t>
+            </a:r>
+            <a:r>
+              <a:rPr lang="fr-CH" baseline="0" dirty="0" smtClean="0"/>
+              <a:t> : D’après moi oui, le cahier des charges indique que lors d’une demande d’un utilisateur, seul l’ami de celui-ci devrait la voir, mais le fait que tout le monde peut la voir ne me dérange pas et je préfère ainsi</a:t>
+            </a:r>
+            <a:endParaRPr lang="fr-CH" dirty="0"/>
+          </a:p>
+        </p:txBody>
+      </p:sp>
+      <p:sp>
+        <p:nvSpPr>
+          <p:cNvPr id="4" name="Espace réservé du numéro de diapositive 3"/>
+          <p:cNvSpPr>
+            <a:spLocks noGrp="1"/>
+          </p:cNvSpPr>
+          <p:nvPr>
+            <p:ph type="sldNum" sz="quarter" idx="10"/>
+          </p:nvPr>
+        </p:nvSpPr>
+        <p:spPr/>
+        <p:txBody>
+          <a:bodyPr/>
+          <a:lstStyle/>
+          <a:p>
+            <a:fld id="{8AFFD8A8-AF0E-48C0-AD02-046E459B6D7A}" type="slidenum">
+              <a:rPr lang="fr-CH" smtClean="0"/>
+              <a:t>20</a:t>
+            </a:fld>
+            <a:endParaRPr lang="fr-CH"/>
+          </a:p>
+        </p:txBody>
+      </p:sp>
+    </p:spTree>
+    <p:extLst>
+      <p:ext uri="{BB962C8B-B14F-4D97-AF65-F5344CB8AC3E}">
+        <p14:creationId xmlns:p14="http://schemas.microsoft.com/office/powerpoint/2010/main" val="3421075578"/>
+      </p:ext>
+    </p:extLst>
+  </p:cSld>
+  <p:clrMapOvr>
+    <a:masterClrMapping/>
+  </p:clrMapOvr>
+</p:notes>
+</file>
+
 <file path=ppt/notesSlides/notesSlide2.xml><?xml version="1.0" encoding="utf-8"?>
 <p:notes xmlns:a="http://schemas.openxmlformats.org/drawingml/2006/main" xmlns:r="http://schemas.openxmlformats.org/officeDocument/2006/relationships" xmlns:p="http://schemas.openxmlformats.org/presentationml/2006/main">
   <p:cSld>
@@ -715,19 +814,7 @@
           <a:p>
             <a:r>
               <a:rPr lang="fr-CH" dirty="0" smtClean="0"/>
-              <a:t>Event</a:t>
-            </a:r>
-            <a:r>
-              <a:rPr lang="fr-CH" baseline="0" dirty="0" smtClean="0"/>
-              <a:t> – Table fournie par </a:t>
-            </a:r>
-            <a:r>
-              <a:rPr lang="fr-CH" baseline="0" dirty="0" err="1" smtClean="0"/>
-              <a:t>FullCalendar</a:t>
-            </a:r>
-            <a:r>
-              <a:rPr lang="fr-CH" baseline="0" dirty="0" smtClean="0"/>
-              <a:t> pour gérer le calendrier</a:t>
+              <a:t>Réalisation = Documentation</a:t>
             </a:r>
             <a:endParaRPr lang="fr-CH" dirty="0"/>
           </a:p>
@@ -750,7 +837,7 @@
           <a:p>
             <a:fld id="{8AFFD8A8-AF0E-48C0-AD02-046E459B6D7A}" type="slidenum">
               <a:rPr lang="fr-CH" smtClean="0"/>
-              <a:t>9</a:t>
+              <a:t>5</a:t>
             </a:fld>
             <a:endParaRPr lang="fr-CH"/>
           </a:p>
@@ -759,7 +846,7 @@
     </p:spTree>
     <p:extLst>
       <p:ext uri="{BB962C8B-B14F-4D97-AF65-F5344CB8AC3E}">
-        <p14:creationId xmlns:p14="http://schemas.microsoft.com/office/powerpoint/2010/main" val="1312417134"/>
+        <p14:creationId xmlns:p14="http://schemas.microsoft.com/office/powerpoint/2010/main" val="2312207502"/>
       </p:ext>
     </p:extLst>
   </p:cSld>
@@ -814,65 +901,21 @@
           <a:lstStyle/>
           <a:p>
             <a:r>
-              <a:rPr lang="fr-CH" dirty="0" err="1" smtClean="0"/>
-              <a:t>Regex</a:t>
+              <a:rPr lang="fr-CH" dirty="0" smtClean="0"/>
+              <a:t>Event</a:t>
             </a:r>
             <a:r>
               <a:rPr lang="fr-CH" baseline="0" dirty="0" smtClean="0"/>
-              <a:t> : </a:t>
-            </a:r>
-          </a:p>
-          <a:p>
+              <a:t> – Table fournie par </a:t>
+            </a:r>
+            <a:r>
+              <a:rPr lang="fr-CH" baseline="0" dirty="0" err="1" smtClean="0"/>
+              <a:t>FullCalendar</a:t>
+            </a:r>
             <a:r>
               <a:rPr lang="fr-CH" baseline="0" dirty="0" smtClean="0"/>
-              <a:t>Inscription : Tous sauf login et mot de passe</a:t>
-            </a:r>
-          </a:p>
-          <a:p>
-            <a:endParaRPr lang="fr-CH" baseline="0" dirty="0" smtClean="0"/>
-          </a:p>
-          <a:p>
-            <a:r>
-              <a:rPr lang="fr-CH" baseline="0" dirty="0" smtClean="0"/>
-              <a:t>Connexion : Aucun, vérification d’un match</a:t>
-            </a:r>
-          </a:p>
-          <a:p>
-            <a:endParaRPr lang="fr-CH" baseline="0" dirty="0" smtClean="0"/>
-          </a:p>
-          <a:p>
-            <a:r>
-              <a:rPr lang="fr-CH" baseline="0" dirty="0" smtClean="0"/>
-              <a:t>Demander PH : 2 champ type date ( -&gt; Aucun </a:t>
-            </a:r>
-            <a:r>
-              <a:rPr lang="fr-CH" baseline="0" dirty="0" err="1" smtClean="0"/>
-              <a:t>regex</a:t>
-            </a:r>
-            <a:r>
-              <a:rPr lang="fr-CH" baseline="0" dirty="0" smtClean="0"/>
-              <a:t>)</a:t>
-            </a:r>
-          </a:p>
-          <a:p>
-            <a:endParaRPr lang="fr-CH" baseline="0" dirty="0" smtClean="0"/>
-          </a:p>
-          <a:p>
-            <a:r>
-              <a:rPr lang="fr-CH" baseline="0" dirty="0" smtClean="0"/>
-              <a:t>Message : Max 600 caractères</a:t>
-            </a:r>
-          </a:p>
-          <a:p>
-            <a:endParaRPr lang="fr-CH" baseline="0" dirty="0" smtClean="0"/>
-          </a:p>
-          <a:p>
-            <a:r>
-              <a:rPr lang="fr-CH" baseline="0" dirty="0" smtClean="0"/>
-              <a:t>Réserver PH : Aucun</a:t>
-            </a:r>
-          </a:p>
-          <a:p>
+              <a:t> pour gérer le calendrier</a:t>
+            </a:r>
             <a:endParaRPr lang="fr-CH" dirty="0"/>
           </a:p>
         </p:txBody>
@@ -894,7 +937,7 @@
           <a:p>
             <a:fld id="{8AFFD8A8-AF0E-48C0-AD02-046E459B6D7A}" type="slidenum">
               <a:rPr lang="fr-CH" smtClean="0"/>
-              <a:t>12</a:t>
+              <a:t>9</a:t>
             </a:fld>
             <a:endParaRPr lang="fr-CH"/>
           </a:p>
@@ -903,7 +946,7 @@
     </p:spTree>
     <p:extLst>
       <p:ext uri="{BB962C8B-B14F-4D97-AF65-F5344CB8AC3E}">
-        <p14:creationId xmlns:p14="http://schemas.microsoft.com/office/powerpoint/2010/main" val="2553448180"/>
+        <p14:creationId xmlns:p14="http://schemas.microsoft.com/office/powerpoint/2010/main" val="1312417134"/>
       </p:ext>
     </p:extLst>
   </p:cSld>
@@ -958,13 +1001,66 @@
           <a:lstStyle/>
           <a:p>
             <a:r>
-              <a:rPr lang="fr-CH" dirty="0" smtClean="0"/>
-              <a:t>Site sur lequel quelqu’un offrait</a:t>
+              <a:rPr lang="fr-CH" dirty="0" err="1" smtClean="0"/>
+              <a:t>Regex</a:t>
             </a:r>
             <a:r>
               <a:rPr lang="fr-CH" baseline="0" dirty="0" smtClean="0"/>
-              <a:t> une version avec un Base de données</a:t>
-            </a:r>
+              <a:t> : </a:t>
+            </a:r>
+          </a:p>
+          <a:p>
+            <a:r>
+              <a:rPr lang="fr-CH" baseline="0" dirty="0" smtClean="0"/>
+              <a:t>Inscription : Tous sauf login et mot de passe</a:t>
+            </a:r>
+          </a:p>
+          <a:p>
+            <a:endParaRPr lang="fr-CH" baseline="0" dirty="0" smtClean="0"/>
+          </a:p>
+          <a:p>
+            <a:r>
+              <a:rPr lang="fr-CH" baseline="0" dirty="0" smtClean="0"/>
+              <a:t>Connexion : Aucun, vérification d’un match</a:t>
+            </a:r>
+          </a:p>
+          <a:p>
+            <a:endParaRPr lang="fr-CH" baseline="0" dirty="0" smtClean="0"/>
+          </a:p>
+          <a:p>
+            <a:r>
+              <a:rPr lang="fr-CH" baseline="0" dirty="0" smtClean="0"/>
+              <a:t>Demander PH : 2 champ type date ( -&gt; Aucun </a:t>
+            </a:r>
+            <a:r>
+              <a:rPr lang="fr-CH" baseline="0" dirty="0" err="1" smtClean="0"/>
+              <a:t>regex</a:t>
+            </a:r>
+            <a:r>
+              <a:rPr lang="fr-CH" baseline="0" dirty="0" smtClean="0"/>
+              <a:t>)</a:t>
+            </a:r>
+          </a:p>
+          <a:p>
+            <a:endParaRPr lang="fr-CH" baseline="0" dirty="0" smtClean="0"/>
+          </a:p>
+          <a:p>
+            <a:r>
+              <a:rPr lang="fr-CH" baseline="0" dirty="0" smtClean="0"/>
+              <a:t>Message : Max 600 caractères</a:t>
+            </a:r>
+          </a:p>
+          <a:p>
+            <a:endParaRPr lang="fr-CH" baseline="0" dirty="0" smtClean="0"/>
+          </a:p>
+          <a:p>
+            <a:r>
+              <a:rPr lang="fr-CH" baseline="0" dirty="0" smtClean="0"/>
+              <a:t>Réserver PH : Aucun</a:t>
+            </a:r>
+          </a:p>
+          <a:p>
+            <a:endParaRPr lang="fr-CH" dirty="0"/>
           </a:p>
         </p:txBody>
       </p:sp>
@@ -985,7 +1081,7 @@
           <a:p>
             <a:fld id="{8AFFD8A8-AF0E-48C0-AD02-046E459B6D7A}" type="slidenum">
               <a:rPr lang="fr-CH" smtClean="0"/>
-              <a:t>13</a:t>
+              <a:t>12</a:t>
             </a:fld>
             <a:endParaRPr lang="fr-CH"/>
           </a:p>
@@ -994,7 +1090,7 @@
     </p:spTree>
     <p:extLst>
       <p:ext uri="{BB962C8B-B14F-4D97-AF65-F5344CB8AC3E}">
-        <p14:creationId xmlns:p14="http://schemas.microsoft.com/office/powerpoint/2010/main" val="1182408664"/>
+        <p14:creationId xmlns:p14="http://schemas.microsoft.com/office/powerpoint/2010/main" val="2553448180"/>
       </p:ext>
     </p:extLst>
   </p:cSld>
@@ -1050,26 +1146,11 @@
           <a:p>
             <a:r>
               <a:rPr lang="fr-CH" dirty="0" smtClean="0"/>
-              <a:t>Vérification des sessions : Page</a:t>
+              <a:t>Site sur lequel quelqu’un offrait</a:t>
             </a:r>
             <a:r>
               <a:rPr lang="fr-CH" baseline="0" dirty="0" smtClean="0"/>
-              <a:t>s admin inaccessible si utilisateur</a:t>
-            </a:r>
-          </a:p>
-          <a:p>
-            <a:r>
-              <a:rPr lang="fr-CH" baseline="0" dirty="0" smtClean="0"/>
-              <a:t>Page utilisateur inaccessible si déconnecté</a:t>
-            </a:r>
-          </a:p>
-          <a:p>
-            <a:endParaRPr lang="fr-CH" baseline="0" dirty="0" smtClean="0"/>
-          </a:p>
-          <a:p>
-            <a:r>
-              <a:rPr lang="fr-CH" baseline="0" dirty="0" smtClean="0"/>
-              <a:t>Vérification des champs URL : si le type est modifié, n’affiche pas d’erreur à l’aide d’un if dans le GET</a:t>
+              <a:t> une version avec un Base de données</a:t>
             </a:r>
           </a:p>
         </p:txBody>
@@ -1091,7 +1172,7 @@
           <a:p>
             <a:fld id="{8AFFD8A8-AF0E-48C0-AD02-046E459B6D7A}" type="slidenum">
               <a:rPr lang="fr-CH" smtClean="0"/>
-              <a:t>14</a:t>
+              <a:t>13</a:t>
             </a:fld>
             <a:endParaRPr lang="fr-CH"/>
           </a:p>
@@ -1100,7 +1181,7 @@
     </p:spTree>
     <p:extLst>
       <p:ext uri="{BB962C8B-B14F-4D97-AF65-F5344CB8AC3E}">
-        <p14:creationId xmlns:p14="http://schemas.microsoft.com/office/powerpoint/2010/main" val="1105374032"/>
+        <p14:creationId xmlns:p14="http://schemas.microsoft.com/office/powerpoint/2010/main" val="1182408664"/>
       </p:ext>
     </p:extLst>
   </p:cSld>
@@ -1156,15 +1237,17 @@
           <a:p>
             <a:r>
               <a:rPr lang="fr-CH" dirty="0" smtClean="0"/>
-              <a:t>Démo à d’autre personne pour avoir un point de vue </a:t>
-            </a:r>
-            <a:r>
-              <a:rPr lang="fr-CH" dirty="0" err="1" smtClean="0"/>
-              <a:t>exterieur</a:t>
+              <a:t>Vérification des sessions : Page</a:t>
             </a:r>
             <a:r>
               <a:rPr lang="fr-CH" baseline="0" dirty="0" smtClean="0"/>
-              <a:t> </a:t>
+              <a:t>s admin inaccessible si utilisateur</a:t>
+            </a:r>
+          </a:p>
+          <a:p>
+            <a:r>
+              <a:rPr lang="fr-CH" baseline="0" dirty="0" smtClean="0"/>
+              <a:t>Page utilisateur inaccessible si déconnecté</a:t>
             </a:r>
           </a:p>
           <a:p>
@@ -1172,30 +1255,9 @@
           </a:p>
           <a:p>
             <a:r>
-              <a:rPr lang="fr-CH" baseline="0" dirty="0" err="1" smtClean="0"/>
-              <a:t>Tamper</a:t>
-            </a:r>
-            <a:r>
               <a:rPr lang="fr-CH" baseline="0" dirty="0" smtClean="0"/>
-              <a:t> data : Plug-In </a:t>
-            </a:r>
-            <a:r>
-              <a:rPr lang="fr-CH" baseline="0" dirty="0" err="1" smtClean="0"/>
-              <a:t>Tamper</a:t>
-            </a:r>
-            <a:r>
-              <a:rPr lang="fr-CH" baseline="0" dirty="0" smtClean="0"/>
-              <a:t> Data sur Firefox afin d’</a:t>
-            </a:r>
-            <a:r>
-              <a:rPr lang="fr-CH" baseline="0" dirty="0" err="1" smtClean="0"/>
-              <a:t>alterer</a:t>
-            </a:r>
-            <a:r>
-              <a:rPr lang="fr-CH" baseline="0" dirty="0" smtClean="0"/>
-              <a:t> les données d’un formulaire</a:t>
-            </a:r>
-            <a:endParaRPr lang="fr-CH" dirty="0"/>
+              <a:t>Vérification des champs URL : si le type est modifié, n’affiche pas d’erreur à l’aide d’un if dans le GET</a:t>
+            </a:r>
           </a:p>
         </p:txBody>
       </p:sp>
@@ -1216,7 +1278,7 @@
           <a:p>
             <a:fld id="{8AFFD8A8-AF0E-48C0-AD02-046E459B6D7A}" type="slidenum">
               <a:rPr lang="fr-CH" smtClean="0"/>
-              <a:t>15</a:t>
+              <a:t>14</a:t>
             </a:fld>
             <a:endParaRPr lang="fr-CH"/>
           </a:p>
@@ -1225,7 +1287,7 @@
     </p:spTree>
     <p:extLst>
       <p:ext uri="{BB962C8B-B14F-4D97-AF65-F5344CB8AC3E}">
-        <p14:creationId xmlns:p14="http://schemas.microsoft.com/office/powerpoint/2010/main" val="549891648"/>
+        <p14:creationId xmlns:p14="http://schemas.microsoft.com/office/powerpoint/2010/main" val="1105374032"/>
       </p:ext>
     </p:extLst>
   </p:cSld>
@@ -1281,46 +1343,49 @@
           <a:p>
             <a:r>
               <a:rPr lang="fr-CH" dirty="0" smtClean="0"/>
-              <a:t>Utilisation</a:t>
+              <a:t>Démo à d’autre personne pour avoir un point de </a:t>
+            </a:r>
+            <a:r>
+              <a:rPr lang="fr-CH" smtClean="0"/>
+              <a:t>vue </a:t>
+            </a:r>
+            <a:r>
+              <a:rPr lang="fr-CH" smtClean="0"/>
+              <a:t>exterieur</a:t>
+            </a:r>
+            <a:r>
+              <a:rPr lang="fr-CH" baseline="0" smtClean="0"/>
+              <a:t> </a:t>
+            </a:r>
+            <a:endParaRPr lang="fr-CH" baseline="0" dirty="0" smtClean="0"/>
+          </a:p>
+          <a:p>
+            <a:endParaRPr lang="fr-CH" baseline="0" dirty="0" smtClean="0"/>
+          </a:p>
+          <a:p>
+            <a:r>
+              <a:rPr lang="fr-CH" baseline="0" dirty="0" err="1" smtClean="0"/>
+              <a:t>Tamper</a:t>
             </a:r>
             <a:r>
               <a:rPr lang="fr-CH" baseline="0" dirty="0" smtClean="0"/>
-              <a:t> d’un Framework : Jamais fais auparavant </a:t>
-            </a:r>
-            <a:endParaRPr lang="fr-CH" dirty="0" smtClean="0"/>
-          </a:p>
-          <a:p>
-            <a:endParaRPr lang="fr-CH" dirty="0" smtClean="0"/>
-          </a:p>
-          <a:p>
-            <a:r>
-              <a:rPr lang="fr-CH" dirty="0" smtClean="0"/>
-              <a:t>Calendrier n’est pas supposé utiliser une base de donnée, cela paraissait donc difficile à faire, 2 jour dessus avant</a:t>
+              <a:t> data : Plug-In </a:t>
+            </a:r>
+            <a:r>
+              <a:rPr lang="fr-CH" baseline="0" dirty="0" err="1" smtClean="0"/>
+              <a:t>Tamper</a:t>
             </a:r>
             <a:r>
               <a:rPr lang="fr-CH" baseline="0" dirty="0" smtClean="0"/>
-              <a:t> de trouver un code </a:t>
+              <a:t> Data sur Firefox afin d’</a:t>
             </a:r>
             <a:r>
               <a:rPr lang="fr-CH" baseline="0" dirty="0" err="1" smtClean="0"/>
-              <a:t>opensource</a:t>
+              <a:t>alterer</a:t>
             </a:r>
             <a:r>
               <a:rPr lang="fr-CH" baseline="0" dirty="0" smtClean="0"/>
-              <a:t> permettant l’utilisation de SQL</a:t>
-            </a:r>
-          </a:p>
-          <a:p>
-            <a:endParaRPr lang="fr-CH" baseline="0" dirty="0" smtClean="0"/>
-          </a:p>
-          <a:p>
-            <a:r>
-              <a:rPr lang="fr-CH" baseline="0" dirty="0" smtClean="0"/>
-              <a:t>Bug : Impossible d’agrandir les photo si trop proche du </a:t>
-            </a:r>
-            <a:r>
-              <a:rPr lang="fr-CH" baseline="0" dirty="0" err="1" smtClean="0"/>
-              <a:t>footer</a:t>
+              <a:t> les données d’un formulaire</a:t>
             </a:r>
             <a:endParaRPr lang="fr-CH" dirty="0"/>
           </a:p>
@@ -1343,7 +1408,7 @@
           <a:p>
             <a:fld id="{8AFFD8A8-AF0E-48C0-AD02-046E459B6D7A}" type="slidenum">
               <a:rPr lang="fr-CH" smtClean="0"/>
-              <a:t>16</a:t>
+              <a:t>15</a:t>
             </a:fld>
             <a:endParaRPr lang="fr-CH"/>
           </a:p>
@@ -1352,7 +1417,7 @@
     </p:spTree>
     <p:extLst>
       <p:ext uri="{BB962C8B-B14F-4D97-AF65-F5344CB8AC3E}">
-        <p14:creationId xmlns:p14="http://schemas.microsoft.com/office/powerpoint/2010/main" val="3867652665"/>
+        <p14:creationId xmlns:p14="http://schemas.microsoft.com/office/powerpoint/2010/main" val="549891648"/>
       </p:ext>
     </p:extLst>
   </p:cSld>
@@ -1408,11 +1473,46 @@
           <a:p>
             <a:r>
               <a:rPr lang="fr-CH" dirty="0" smtClean="0"/>
-              <a:t>Projet fini ?</a:t>
+              <a:t>Utilisation</a:t>
             </a:r>
             <a:r>
               <a:rPr lang="fr-CH" baseline="0" dirty="0" smtClean="0"/>
-              <a:t> : D’après moi oui, le cahier des charges indique que lors d’une demande d’un utilisateur, seul l’ami de celui-ci devrait la voir, mais le fait que tout le monde peut la voir ne me dérange pas et je préfère ainsi</a:t>
+              <a:t> d’un Framework : Jamais fais auparavant </a:t>
+            </a:r>
+            <a:endParaRPr lang="fr-CH" dirty="0" smtClean="0"/>
+          </a:p>
+          <a:p>
+            <a:endParaRPr lang="fr-CH" dirty="0" smtClean="0"/>
+          </a:p>
+          <a:p>
+            <a:r>
+              <a:rPr lang="fr-CH" dirty="0" smtClean="0"/>
+              <a:t>Calendrier n’est pas supposé utiliser une base de donnée, cela paraissait donc difficile à faire, 2 jour dessus avant</a:t>
+            </a:r>
+            <a:r>
+              <a:rPr lang="fr-CH" baseline="0" dirty="0" smtClean="0"/>
+              <a:t> de trouver un code </a:t>
+            </a:r>
+            <a:r>
+              <a:rPr lang="fr-CH" baseline="0" dirty="0" err="1" smtClean="0"/>
+              <a:t>opensource</a:t>
+            </a:r>
+            <a:r>
+              <a:rPr lang="fr-CH" baseline="0" dirty="0" smtClean="0"/>
+              <a:t> permettant l’utilisation de SQL</a:t>
+            </a:r>
+          </a:p>
+          <a:p>
+            <a:endParaRPr lang="fr-CH" baseline="0" dirty="0" smtClean="0"/>
+          </a:p>
+          <a:p>
+            <a:r>
+              <a:rPr lang="fr-CH" baseline="0" dirty="0" smtClean="0"/>
+              <a:t>Bug : Impossible d’agrandir les photo si trop proche du </a:t>
+            </a:r>
+            <a:r>
+              <a:rPr lang="fr-CH" baseline="0" dirty="0" err="1" smtClean="0"/>
+              <a:t>footer</a:t>
             </a:r>
             <a:endParaRPr lang="fr-CH" dirty="0"/>
           </a:p>
@@ -1435,7 +1535,7 @@
           <a:p>
             <a:fld id="{8AFFD8A8-AF0E-48C0-AD02-046E459B6D7A}" type="slidenum">
               <a:rPr lang="fr-CH" smtClean="0"/>
-              <a:t>18</a:t>
+              <a:t>16</a:t>
             </a:fld>
             <a:endParaRPr lang="fr-CH"/>
           </a:p>
@@ -1444,7 +1544,7 @@
     </p:spTree>
     <p:extLst>
       <p:ext uri="{BB962C8B-B14F-4D97-AF65-F5344CB8AC3E}">
-        <p14:creationId xmlns:p14="http://schemas.microsoft.com/office/powerpoint/2010/main" val="3421075578"/>
+        <p14:creationId xmlns:p14="http://schemas.microsoft.com/office/powerpoint/2010/main" val="3867652665"/>
       </p:ext>
     </p:extLst>
   </p:cSld>
@@ -2192,15 +2292,19 @@
             <p:ph type="dt" sz="half" idx="10"/>
           </p:nvPr>
         </p:nvSpPr>
-        <p:spPr/>
-        <p:txBody>
-          <a:bodyPr/>
-          <a:lstStyle/>
-          <a:p>
-            <a:fld id="{B61BEF0D-F0BB-DE4B-95CE-6DB70DBA9567}" type="datetimeFigureOut">
-              <a:rPr lang="en-US" dirty="0"/>
-              <a:pPr/>
-              <a:t>6/16/2017</a:t>
+        <p:spPr>
+          <a:xfrm>
+            <a:off x="1898421" y="6492875"/>
+            <a:ext cx="911939" cy="365125"/>
+          </a:xfrm>
+        </p:spPr>
+        <p:txBody>
+          <a:bodyPr/>
+          <a:lstStyle/>
+          <a:p>
+            <a:fld id="{5867C393-DBBF-4EE2-AC23-443983B46D32}" type="datetime1">
+              <a:rPr lang="fr-CH" smtClean="0"/>
+              <a:t>26.06.2017</a:t>
             </a:fld>
             <a:endParaRPr lang="en-US" dirty="0"/>
           </a:p>
@@ -2221,6 +2325,10 @@
           <a:bodyPr/>
           <a:lstStyle/>
           <a:p>
+            <a:r>
+              <a:rPr lang="en-US" smtClean="0"/>
+              <a:t>Timothée Guggisberg</a:t>
+            </a:r>
             <a:endParaRPr lang="en-US" dirty="0"/>
           </a:p>
         </p:txBody>
@@ -2235,13 +2343,18 @@
             <p:ph type="sldNum" sz="quarter" idx="12"/>
           </p:nvPr>
         </p:nvSpPr>
-        <p:spPr/>
+        <p:spPr>
+          <a:xfrm>
+            <a:off x="0" y="6492875"/>
+            <a:ext cx="683339" cy="365125"/>
+          </a:xfrm>
+        </p:spPr>
         <p:txBody>
           <a:bodyPr/>
           <a:lstStyle/>
           <a:p>
             <a:fld id="{D57F1E4F-1CFF-5643-939E-217C01CDF565}" type="slidenum">
-              <a:rPr lang="en-US" dirty="0"/>
+              <a:rPr lang="en-US" smtClean="0"/>
               <a:pPr/>
               <a:t>‹N°›</a:t>
             </a:fld>
@@ -2254,6 +2367,13 @@
   <p:clrMapOvr>
     <a:masterClrMapping/>
   </p:clrMapOvr>
+  <p:timing>
+    <p:tnLst>
+      <p:par>
+        <p:cTn id="1" dur="indefinite" restart="never" nodeType="tmRoot"/>
+      </p:par>
+    </p:tnLst>
+  </p:timing>
 </p:sldLayout>
 </file>
 
@@ -2445,10 +2565,9 @@
           <a:bodyPr/>
           <a:lstStyle/>
           <a:p>
-            <a:fld id="{B61BEF0D-F0BB-DE4B-95CE-6DB70DBA9567}" type="datetimeFigureOut">
-              <a:rPr lang="en-US" dirty="0"/>
-              <a:pPr/>
-              <a:t>6/16/2017</a:t>
+            <a:fld id="{18BF5E49-7E4F-4E1C-9C6F-F586558FF346}" type="datetime1">
+              <a:rPr lang="fr-CH" smtClean="0"/>
+              <a:t>26.06.2017</a:t>
             </a:fld>
             <a:endParaRPr lang="en-US" dirty="0"/>
           </a:p>
@@ -2469,6 +2588,10 @@
           <a:bodyPr/>
           <a:lstStyle/>
           <a:p>
+            <a:r>
+              <a:rPr lang="en-US" smtClean="0"/>
+              <a:t>Timothée Guggisberg</a:t>
+            </a:r>
             <a:endParaRPr lang="en-US" dirty="0"/>
           </a:p>
         </p:txBody>
@@ -2502,6 +2625,13 @@
   <p:clrMapOvr>
     <a:masterClrMapping/>
   </p:clrMapOvr>
+  <p:timing>
+    <p:tnLst>
+      <p:par>
+        <p:cTn id="1" dur="indefinite" restart="never" nodeType="tmRoot"/>
+      </p:par>
+    </p:tnLst>
+  </p:timing>
 </p:sldLayout>
 </file>
 
@@ -2756,10 +2886,9 @@
           <a:bodyPr/>
           <a:lstStyle/>
           <a:p>
-            <a:fld id="{B61BEF0D-F0BB-DE4B-95CE-6DB70DBA9567}" type="datetimeFigureOut">
-              <a:rPr lang="en-US" dirty="0"/>
-              <a:pPr/>
-              <a:t>6/16/2017</a:t>
+            <a:fld id="{5BDBF9E2-6A6F-4D7F-AE41-2BE6911262F1}" type="datetime1">
+              <a:rPr lang="fr-CH" smtClean="0"/>
+              <a:t>26.06.2017</a:t>
             </a:fld>
             <a:endParaRPr lang="en-US" dirty="0"/>
           </a:p>
@@ -2780,6 +2909,10 @@
           <a:bodyPr/>
           <a:lstStyle/>
           <a:p>
+            <a:r>
+              <a:rPr lang="en-US" smtClean="0"/>
+              <a:t>Timothée Guggisberg</a:t>
+            </a:r>
             <a:endParaRPr lang="en-US" dirty="0"/>
           </a:p>
         </p:txBody>
@@ -2895,6 +3028,13 @@
   <p:clrMapOvr>
     <a:masterClrMapping/>
   </p:clrMapOvr>
+  <p:timing>
+    <p:tnLst>
+      <p:par>
+        <p:cTn id="1" dur="indefinite" restart="never" nodeType="tmRoot"/>
+      </p:par>
+    </p:tnLst>
+  </p:timing>
 </p:sldLayout>
 </file>
 
@@ -3086,10 +3226,9 @@
           <a:bodyPr/>
           <a:lstStyle/>
           <a:p>
-            <a:fld id="{B61BEF0D-F0BB-DE4B-95CE-6DB70DBA9567}" type="datetimeFigureOut">
-              <a:rPr lang="en-US" dirty="0"/>
-              <a:pPr/>
-              <a:t>6/16/2017</a:t>
+            <a:fld id="{80FA0306-6411-49E5-9169-FB1795742849}" type="datetime1">
+              <a:rPr lang="fr-CH" smtClean="0"/>
+              <a:t>26.06.2017</a:t>
             </a:fld>
             <a:endParaRPr lang="en-US" dirty="0"/>
           </a:p>
@@ -3110,6 +3249,10 @@
           <a:bodyPr/>
           <a:lstStyle/>
           <a:p>
+            <a:r>
+              <a:rPr lang="en-US" smtClean="0"/>
+              <a:t>Timothée Guggisberg</a:t>
+            </a:r>
             <a:endParaRPr lang="en-US" dirty="0"/>
           </a:p>
         </p:txBody>
@@ -3143,6 +3286,13 @@
   <p:clrMapOvr>
     <a:masterClrMapping/>
   </p:clrMapOvr>
+  <p:timing>
+    <p:tnLst>
+      <p:par>
+        <p:cTn id="1" dur="indefinite" restart="never" nodeType="tmRoot"/>
+      </p:par>
+    </p:tnLst>
+  </p:timing>
 </p:sldLayout>
 </file>
 
@@ -3397,10 +3547,9 @@
           <a:bodyPr/>
           <a:lstStyle/>
           <a:p>
-            <a:fld id="{B61BEF0D-F0BB-DE4B-95CE-6DB70DBA9567}" type="datetimeFigureOut">
-              <a:rPr lang="en-US" dirty="0"/>
-              <a:pPr/>
-              <a:t>6/16/2017</a:t>
+            <a:fld id="{C2987E7F-C2BA-4F51-BBD1-5163E9194940}" type="datetime1">
+              <a:rPr lang="fr-CH" smtClean="0"/>
+              <a:t>26.06.2017</a:t>
             </a:fld>
             <a:endParaRPr lang="en-US" dirty="0"/>
           </a:p>
@@ -3421,6 +3570,10 @@
           <a:bodyPr/>
           <a:lstStyle/>
           <a:p>
+            <a:r>
+              <a:rPr lang="en-US" smtClean="0"/>
+              <a:t>Timothée Guggisberg</a:t>
+            </a:r>
             <a:endParaRPr lang="en-US" dirty="0"/>
           </a:p>
         </p:txBody>
@@ -3536,6 +3689,13 @@
   <p:clrMapOvr>
     <a:masterClrMapping/>
   </p:clrMapOvr>
+  <p:timing>
+    <p:tnLst>
+      <p:par>
+        <p:cTn id="1" dur="indefinite" restart="never" nodeType="tmRoot"/>
+      </p:par>
+    </p:tnLst>
+  </p:timing>
 </p:sldLayout>
 </file>
 
@@ -3787,10 +3947,9 @@
           <a:bodyPr/>
           <a:lstStyle/>
           <a:p>
-            <a:fld id="{B61BEF0D-F0BB-DE4B-95CE-6DB70DBA9567}" type="datetimeFigureOut">
-              <a:rPr lang="en-US" dirty="0"/>
-              <a:pPr/>
-              <a:t>6/16/2017</a:t>
+            <a:fld id="{51F8CCF1-1FC2-47E4-9A0E-E0FBC0A5292E}" type="datetime1">
+              <a:rPr lang="fr-CH" smtClean="0"/>
+              <a:t>26.06.2017</a:t>
             </a:fld>
             <a:endParaRPr lang="en-US" dirty="0"/>
           </a:p>
@@ -3811,6 +3970,10 @@
           <a:bodyPr/>
           <a:lstStyle/>
           <a:p>
+            <a:r>
+              <a:rPr lang="en-US" smtClean="0"/>
+              <a:t>Timothée Guggisberg</a:t>
+            </a:r>
             <a:endParaRPr lang="en-US" dirty="0"/>
           </a:p>
         </p:txBody>
@@ -3844,6 +4007,13 @@
   <p:clrMapOvr>
     <a:masterClrMapping/>
   </p:clrMapOvr>
+  <p:timing>
+    <p:tnLst>
+      <p:par>
+        <p:cTn id="1" dur="indefinite" restart="never" nodeType="tmRoot"/>
+      </p:par>
+    </p:tnLst>
+  </p:timing>
 </p:sldLayout>
 </file>
 
@@ -3954,9 +4124,9 @@
           <a:bodyPr/>
           <a:lstStyle/>
           <a:p>
-            <a:fld id="{55C6B4A9-1611-4792-9094-5F34BCA07E0B}" type="datetimeFigureOut">
-              <a:rPr lang="en-US" dirty="0"/>
-              <a:t>6/16/2017</a:t>
+            <a:fld id="{BEB12C1E-AF5D-42FC-9768-E5740A0AC712}" type="datetime1">
+              <a:rPr lang="fr-CH" smtClean="0"/>
+              <a:t>26.06.2017</a:t>
             </a:fld>
             <a:endParaRPr lang="en-US" dirty="0"/>
           </a:p>
@@ -3977,6 +4147,10 @@
           <a:bodyPr/>
           <a:lstStyle/>
           <a:p>
+            <a:r>
+              <a:rPr lang="en-US" smtClean="0"/>
+              <a:t>Timothée Guggisberg</a:t>
+            </a:r>
             <a:endParaRPr lang="en-US" dirty="0"/>
           </a:p>
         </p:txBody>
@@ -4009,6 +4183,13 @@
   <p:clrMapOvr>
     <a:masterClrMapping/>
   </p:clrMapOvr>
+  <p:timing>
+    <p:tnLst>
+      <p:par>
+        <p:cTn id="1" dur="indefinite" restart="never" nodeType="tmRoot"/>
+      </p:par>
+    </p:tnLst>
+  </p:timing>
 </p:sldLayout>
 </file>
 
@@ -4129,10 +4310,9 @@
           <a:bodyPr/>
           <a:lstStyle/>
           <a:p>
-            <a:fld id="{B61BEF0D-F0BB-DE4B-95CE-6DB70DBA9567}" type="datetimeFigureOut">
-              <a:rPr lang="en-US" dirty="0"/>
-              <a:pPr/>
-              <a:t>6/16/2017</a:t>
+            <a:fld id="{B28FD5CA-FBD2-4E7A-A9FE-3B05E4FF905E}" type="datetime1">
+              <a:rPr lang="fr-CH" smtClean="0"/>
+              <a:t>26.06.2017</a:t>
             </a:fld>
             <a:endParaRPr lang="en-US" dirty="0"/>
           </a:p>
@@ -4153,6 +4333,10 @@
           <a:bodyPr/>
           <a:lstStyle/>
           <a:p>
+            <a:r>
+              <a:rPr lang="en-US" smtClean="0"/>
+              <a:t>Timothée Guggisberg</a:t>
+            </a:r>
             <a:endParaRPr lang="en-US" dirty="0"/>
           </a:p>
         </p:txBody>
@@ -4186,6 +4370,13 @@
   <p:clrMapOvr>
     <a:masterClrMapping/>
   </p:clrMapOvr>
+  <p:timing>
+    <p:tnLst>
+      <p:par>
+        <p:cTn id="1" dur="indefinite" restart="never" nodeType="tmRoot"/>
+      </p:par>
+    </p:tnLst>
+  </p:timing>
 </p:sldLayout>
 </file>
 
@@ -4246,35 +4437,35 @@
           <a:p>
             <a:pPr lvl="0"/>
             <a:r>
-              <a:rPr lang="fr-FR" smtClean="0"/>
+              <a:rPr lang="fr-FR" dirty="0" smtClean="0"/>
               <a:t>Modifier les styles du texte du masque</a:t>
             </a:r>
           </a:p>
           <a:p>
             <a:pPr lvl="1"/>
             <a:r>
-              <a:rPr lang="fr-FR" smtClean="0"/>
+              <a:rPr lang="fr-FR" dirty="0" smtClean="0"/>
               <a:t>Deuxième niveau</a:t>
             </a:r>
           </a:p>
           <a:p>
             <a:pPr lvl="2"/>
             <a:r>
-              <a:rPr lang="fr-FR" smtClean="0"/>
+              <a:rPr lang="fr-FR" dirty="0" smtClean="0"/>
               <a:t>Troisième niveau</a:t>
             </a:r>
           </a:p>
           <a:p>
             <a:pPr lvl="3"/>
             <a:r>
-              <a:rPr lang="fr-FR" smtClean="0"/>
+              <a:rPr lang="fr-FR" dirty="0" smtClean="0"/>
               <a:t>Quatrième niveau</a:t>
             </a:r>
           </a:p>
           <a:p>
             <a:pPr lvl="4"/>
             <a:r>
-              <a:rPr lang="fr-FR" smtClean="0"/>
+              <a:rPr lang="fr-FR" dirty="0" smtClean="0"/>
               <a:t>Cinquième niveau</a:t>
             </a:r>
             <a:endParaRPr lang="en-US" dirty="0"/>
@@ -4296,9 +4487,9 @@
           <a:bodyPr/>
           <a:lstStyle/>
           <a:p>
-            <a:fld id="{42A54C80-263E-416B-A8E0-580EDEADCBDC}" type="datetimeFigureOut">
-              <a:rPr lang="en-US" dirty="0"/>
-              <a:t>6/16/2017</a:t>
+            <a:fld id="{D30887C9-A8A1-447F-AD8C-A2CA07C048BE}" type="datetime1">
+              <a:rPr lang="fr-CH" smtClean="0"/>
+              <a:t>26.06.2017</a:t>
             </a:fld>
             <a:endParaRPr lang="en-US" dirty="0"/>
           </a:p>
@@ -4314,11 +4505,20 @@
             <p:ph type="ftr" sz="quarter" idx="11"/>
           </p:nvPr>
         </p:nvSpPr>
-        <p:spPr/>
-        <p:txBody>
-          <a:bodyPr/>
-          <a:lstStyle/>
-          <a:p>
+        <p:spPr>
+          <a:xfrm>
+            <a:off x="2383032" y="6492875"/>
+            <a:ext cx="6297612" cy="365125"/>
+          </a:xfrm>
+        </p:spPr>
+        <p:txBody>
+          <a:bodyPr/>
+          <a:lstStyle/>
+          <a:p>
+            <a:r>
+              <a:rPr lang="en-US" smtClean="0"/>
+              <a:t>Timothée Guggisberg</a:t>
+            </a:r>
             <a:endParaRPr lang="en-US" dirty="0"/>
           </a:p>
         </p:txBody>
@@ -4333,13 +4533,18 @@
             <p:ph type="sldNum" sz="quarter" idx="12"/>
           </p:nvPr>
         </p:nvSpPr>
-        <p:spPr/>
+        <p:spPr>
+          <a:xfrm>
+            <a:off x="335664" y="6492875"/>
+            <a:ext cx="683339" cy="365125"/>
+          </a:xfrm>
+        </p:spPr>
         <p:txBody>
           <a:bodyPr/>
           <a:lstStyle/>
           <a:p>
             <a:fld id="{519954A3-9DFD-4C44-94BA-B95130A3BA1C}" type="slidenum">
-              <a:rPr lang="en-US" dirty="0"/>
+              <a:rPr lang="en-US" smtClean="0"/>
               <a:t>‹N°›</a:t>
             </a:fld>
             <a:endParaRPr lang="en-US" dirty="0"/>
@@ -4351,6 +4556,13 @@
   <p:clrMapOvr>
     <a:masterClrMapping/>
   </p:clrMapOvr>
+  <p:timing>
+    <p:tnLst>
+      <p:par>
+        <p:cTn id="1" dur="indefinite" restart="never" nodeType="tmRoot"/>
+      </p:par>
+    </p:tnLst>
+  </p:timing>
 </p:sldLayout>
 </file>
 
@@ -4538,10 +4750,9 @@
           <a:bodyPr/>
           <a:lstStyle/>
           <a:p>
-            <a:fld id="{B61BEF0D-F0BB-DE4B-95CE-6DB70DBA9567}" type="datetimeFigureOut">
-              <a:rPr lang="en-US" dirty="0"/>
-              <a:pPr/>
-              <a:t>6/16/2017</a:t>
+            <a:fld id="{4EA94ACA-1FAF-4A8F-987E-5DB60674AF97}" type="datetime1">
+              <a:rPr lang="fr-CH" smtClean="0"/>
+              <a:t>26.06.2017</a:t>
             </a:fld>
             <a:endParaRPr lang="en-US" dirty="0"/>
           </a:p>
@@ -4562,6 +4773,10 @@
           <a:bodyPr/>
           <a:lstStyle/>
           <a:p>
+            <a:r>
+              <a:rPr lang="en-US" smtClean="0"/>
+              <a:t>Timothée Guggisberg</a:t>
+            </a:r>
             <a:endParaRPr lang="en-US" dirty="0"/>
           </a:p>
         </p:txBody>
@@ -4595,6 +4810,13 @@
   <p:clrMapOvr>
     <a:masterClrMapping/>
   </p:clrMapOvr>
+  <p:timing>
+    <p:tnLst>
+      <p:par>
+        <p:cTn id="1" dur="indefinite" restart="never" nodeType="tmRoot"/>
+      </p:par>
+    </p:tnLst>
+  </p:timing>
 </p:sldLayout>
 </file>
 
@@ -4767,9 +4989,9 @@
           <a:bodyPr/>
           <a:lstStyle/>
           <a:p>
-            <a:fld id="{42A54C80-263E-416B-A8E0-580EDEADCBDC}" type="datetimeFigureOut">
-              <a:rPr lang="en-US" dirty="0"/>
-              <a:t>6/16/2017</a:t>
+            <a:fld id="{9847C230-6958-428F-856A-DDB6B4BE9E12}" type="datetime1">
+              <a:rPr lang="fr-CH" smtClean="0"/>
+              <a:t>26.06.2017</a:t>
             </a:fld>
             <a:endParaRPr lang="en-US" dirty="0"/>
           </a:p>
@@ -4790,6 +5012,10 @@
           <a:bodyPr/>
           <a:lstStyle/>
           <a:p>
+            <a:r>
+              <a:rPr lang="en-US" smtClean="0"/>
+              <a:t>Timothée Guggisberg</a:t>
+            </a:r>
             <a:endParaRPr lang="en-US" dirty="0"/>
           </a:p>
         </p:txBody>
@@ -4822,6 +5048,13 @@
   <p:clrMapOvr>
     <a:masterClrMapping/>
   </p:clrMapOvr>
+  <p:timing>
+    <p:tnLst>
+      <p:par>
+        <p:cTn id="1" dur="indefinite" restart="never" nodeType="tmRoot"/>
+      </p:par>
+    </p:tnLst>
+  </p:timing>
 </p:sldLayout>
 </file>
 
@@ -5136,10 +5369,9 @@
           <a:bodyPr/>
           <a:lstStyle/>
           <a:p>
-            <a:fld id="{B61BEF0D-F0BB-DE4B-95CE-6DB70DBA9567}" type="datetimeFigureOut">
-              <a:rPr lang="en-US" dirty="0"/>
-              <a:pPr/>
-              <a:t>6/16/2017</a:t>
+            <a:fld id="{754AC055-9F3B-43C3-99B8-C27BF8FBBB13}" type="datetime1">
+              <a:rPr lang="fr-CH" smtClean="0"/>
+              <a:t>26.06.2017</a:t>
             </a:fld>
             <a:endParaRPr lang="en-US" dirty="0"/>
           </a:p>
@@ -5160,6 +5392,10 @@
           <a:bodyPr/>
           <a:lstStyle/>
           <a:p>
+            <a:r>
+              <a:rPr lang="en-US" smtClean="0"/>
+              <a:t>Timothée Guggisberg</a:t>
+            </a:r>
             <a:endParaRPr lang="en-US" dirty="0"/>
           </a:p>
         </p:txBody>
@@ -5193,6 +5429,13 @@
   <p:clrMapOvr>
     <a:masterClrMapping/>
   </p:clrMapOvr>
+  <p:timing>
+    <p:tnLst>
+      <p:par>
+        <p:cTn id="1" dur="indefinite" restart="never" nodeType="tmRoot"/>
+      </p:par>
+    </p:tnLst>
+  </p:timing>
 </p:sldLayout>
 </file>
 
@@ -5256,10 +5499,9 @@
           <a:bodyPr/>
           <a:lstStyle/>
           <a:p>
-            <a:fld id="{B61BEF0D-F0BB-DE4B-95CE-6DB70DBA9567}" type="datetimeFigureOut">
-              <a:rPr lang="en-US" dirty="0"/>
-              <a:pPr/>
-              <a:t>6/16/2017</a:t>
+            <a:fld id="{1A3E3CD4-FF80-487F-BC7A-F7F5BA7D7E7F}" type="datetime1">
+              <a:rPr lang="fr-CH" smtClean="0"/>
+              <a:t>26.06.2017</a:t>
             </a:fld>
             <a:endParaRPr lang="en-US" dirty="0"/>
           </a:p>
@@ -5280,6 +5522,10 @@
           <a:bodyPr/>
           <a:lstStyle/>
           <a:p>
+            <a:r>
+              <a:rPr lang="en-US" smtClean="0"/>
+              <a:t>Timothée Guggisberg</a:t>
+            </a:r>
             <a:endParaRPr lang="en-US" dirty="0"/>
           </a:p>
         </p:txBody>
@@ -5294,7 +5540,12 @@
             <p:ph type="sldNum" sz="quarter" idx="12"/>
           </p:nvPr>
         </p:nvSpPr>
-        <p:spPr/>
+        <p:spPr>
+          <a:xfrm>
+            <a:off x="335664" y="6492875"/>
+            <a:ext cx="683339" cy="365125"/>
+          </a:xfrm>
+        </p:spPr>
         <p:txBody>
           <a:bodyPr/>
           <a:lstStyle/>
@@ -5313,6 +5564,13 @@
   <p:clrMapOvr>
     <a:masterClrMapping/>
   </p:clrMapOvr>
+  <p:timing>
+    <p:tnLst>
+      <p:par>
+        <p:cTn id="1" dur="indefinite" restart="never" nodeType="tmRoot"/>
+      </p:par>
+    </p:tnLst>
+  </p:timing>
 </p:sldLayout>
 </file>
 
@@ -5348,10 +5606,9 @@
           <a:bodyPr/>
           <a:lstStyle/>
           <a:p>
-            <a:fld id="{B61BEF0D-F0BB-DE4B-95CE-6DB70DBA9567}" type="datetimeFigureOut">
-              <a:rPr lang="en-US" dirty="0"/>
-              <a:pPr/>
-              <a:t>6/16/2017</a:t>
+            <a:fld id="{73CD50EA-F407-4446-93CF-A7215542DB21}" type="datetime1">
+              <a:rPr lang="fr-CH" smtClean="0"/>
+              <a:t>26.06.2017</a:t>
             </a:fld>
             <a:endParaRPr lang="en-US" dirty="0"/>
           </a:p>
@@ -5372,6 +5629,10 @@
           <a:bodyPr/>
           <a:lstStyle/>
           <a:p>
+            <a:r>
+              <a:rPr lang="en-US" smtClean="0"/>
+              <a:t>Timothée Guggisberg</a:t>
+            </a:r>
             <a:endParaRPr lang="en-US" dirty="0"/>
           </a:p>
         </p:txBody>
@@ -5405,6 +5666,13 @@
   <p:clrMapOvr>
     <a:masterClrMapping/>
   </p:clrMapOvr>
+  <p:timing>
+    <p:tnLst>
+      <p:par>
+        <p:cTn id="1" dur="indefinite" restart="never" nodeType="tmRoot"/>
+      </p:par>
+    </p:tnLst>
+  </p:timing>
 </p:sldLayout>
 </file>
 
@@ -5600,9 +5868,9 @@
           <a:bodyPr/>
           <a:lstStyle/>
           <a:p>
-            <a:fld id="{42A54C80-263E-416B-A8E0-580EDEADCBDC}" type="datetimeFigureOut">
-              <a:rPr lang="en-US" dirty="0"/>
-              <a:t>6/16/2017</a:t>
+            <a:fld id="{8CD07BD1-C1B0-4227-B071-98953A9D5D57}" type="datetime1">
+              <a:rPr lang="fr-CH" smtClean="0"/>
+              <a:t>26.06.2017</a:t>
             </a:fld>
             <a:endParaRPr lang="en-US" dirty="0"/>
           </a:p>
@@ -5623,6 +5891,10 @@
           <a:bodyPr/>
           <a:lstStyle/>
           <a:p>
+            <a:r>
+              <a:rPr lang="en-US" smtClean="0"/>
+              <a:t>Timothée Guggisberg</a:t>
+            </a:r>
             <a:endParaRPr lang="en-US" dirty="0"/>
           </a:p>
         </p:txBody>
@@ -5655,6 +5927,13 @@
   <p:clrMapOvr>
     <a:masterClrMapping/>
   </p:clrMapOvr>
+  <p:timing>
+    <p:tnLst>
+      <p:par>
+        <p:cTn id="1" dur="indefinite" restart="never" nodeType="tmRoot"/>
+      </p:par>
+    </p:tnLst>
+  </p:timing>
 </p:sldLayout>
 </file>
 
@@ -5858,6 +6137,10 @@
           <a:bodyPr/>
           <a:lstStyle/>
           <a:p>
+            <a:r>
+              <a:rPr lang="en-US" smtClean="0"/>
+              <a:t>Timothée Guggisberg</a:t>
+            </a:r>
             <a:endParaRPr lang="en-US" dirty="0"/>
           </a:p>
         </p:txBody>
@@ -5901,10 +6184,9 @@
           <a:bodyPr/>
           <a:lstStyle/>
           <a:p>
-            <a:fld id="{B61BEF0D-F0BB-DE4B-95CE-6DB70DBA9567}" type="datetimeFigureOut">
-              <a:rPr lang="en-US" dirty="0"/>
-              <a:pPr/>
-              <a:t>6/16/2017</a:t>
+            <a:fld id="{12165DCE-1EEF-490C-A4C6-76DEC43935CD}" type="datetime1">
+              <a:rPr lang="fr-CH" smtClean="0"/>
+              <a:t>26.06.2017</a:t>
             </a:fld>
             <a:endParaRPr lang="en-US" dirty="0"/>
           </a:p>
@@ -5915,6 +6197,13 @@
   <p:clrMapOvr>
     <a:masterClrMapping/>
   </p:clrMapOvr>
+  <p:timing>
+    <p:tnLst>
+      <p:par>
+        <p:cTn id="1" dur="indefinite" restart="never" nodeType="tmRoot"/>
+      </p:par>
+    </p:tnLst>
+  </p:timing>
 </p:sldLayout>
 </file>
 
@@ -6531,35 +6820,35 @@
           <a:p>
             <a:pPr lvl="0"/>
             <a:r>
-              <a:rPr lang="fr-FR" smtClean="0"/>
+              <a:rPr lang="fr-FR" dirty="0" smtClean="0"/>
               <a:t>Modifier les styles du texte du masque</a:t>
             </a:r>
           </a:p>
           <a:p>
             <a:pPr lvl="1"/>
             <a:r>
-              <a:rPr lang="fr-FR" smtClean="0"/>
+              <a:rPr lang="fr-FR" dirty="0" smtClean="0"/>
               <a:t>Deuxième niveau</a:t>
             </a:r>
           </a:p>
           <a:p>
             <a:pPr lvl="2"/>
             <a:r>
-              <a:rPr lang="fr-FR" smtClean="0"/>
+              <a:rPr lang="fr-FR" dirty="0" smtClean="0"/>
               <a:t>Troisième niveau</a:t>
             </a:r>
           </a:p>
           <a:p>
             <a:pPr lvl="3"/>
             <a:r>
-              <a:rPr lang="fr-FR" smtClean="0"/>
+              <a:rPr lang="fr-FR" dirty="0" smtClean="0"/>
               <a:t>Quatrième niveau</a:t>
             </a:r>
           </a:p>
           <a:p>
             <a:pPr lvl="4"/>
             <a:r>
-              <a:rPr lang="fr-FR" smtClean="0"/>
+              <a:rPr lang="fr-FR" dirty="0" smtClean="0"/>
               <a:t>Cinquième niveau</a:t>
             </a:r>
             <a:endParaRPr lang="en-US" dirty="0"/>
@@ -6578,7 +6867,7 @@
         </p:nvSpPr>
         <p:spPr>
           <a:xfrm>
-            <a:off x="7205133" y="6041362"/>
+            <a:off x="1245048" y="6492875"/>
             <a:ext cx="911939" cy="365125"/>
           </a:xfrm>
           <a:prstGeom prst="rect">
@@ -6599,10 +6888,9 @@
             </a:lvl1pPr>
           </a:lstStyle>
           <a:p>
-            <a:fld id="{B61BEF0D-F0BB-DE4B-95CE-6DB70DBA9567}" type="datetimeFigureOut">
-              <a:rPr lang="en-US" dirty="0"/>
-              <a:pPr/>
-              <a:t>6/16/2017</a:t>
+            <a:fld id="{64AA3D40-7D9A-41C0-BCF8-A0AA4C82606E}" type="datetime1">
+              <a:rPr lang="fr-CH" smtClean="0"/>
+              <a:t>26.06.2017</a:t>
             </a:fld>
             <a:endParaRPr lang="en-US" dirty="0"/>
           </a:p>
@@ -6641,6 +6929,10 @@
             </a:lvl1pPr>
           </a:lstStyle>
           <a:p>
+            <a:r>
+              <a:rPr lang="en-US" smtClean="0"/>
+              <a:t>Timothée Guggisberg</a:t>
+            </a:r>
             <a:endParaRPr lang="en-US" dirty="0"/>
           </a:p>
         </p:txBody>
@@ -6657,7 +6949,7 @@
         </p:nvSpPr>
         <p:spPr>
           <a:xfrm>
-            <a:off x="8590663" y="6041362"/>
+            <a:off x="111388" y="6492875"/>
             <a:ext cx="683339" cy="365125"/>
           </a:xfrm>
           <a:prstGeom prst="rect">
@@ -6677,7 +6969,7 @@
           </a:lstStyle>
           <a:p>
             <a:fld id="{D57F1E4F-1CFF-5643-939E-217C01CDF565}" type="slidenum">
-              <a:rPr lang="en-US" dirty="0"/>
+              <a:rPr lang="en-US" smtClean="0"/>
               <a:pPr/>
               <a:t>‹N°›</a:t>
             </a:fld>
@@ -6706,6 +6998,14 @@
     <p:sldLayoutId id="2147483668" r:id="rId15"/>
     <p:sldLayoutId id="2147483659" r:id="rId16"/>
   </p:sldLayoutIdLst>
+  <p:timing>
+    <p:tnLst>
+      <p:par>
+        <p:cTn id="1" dur="indefinite" restart="never" nodeType="tmRoot"/>
+      </p:par>
+    </p:tnLst>
+  </p:timing>
+  <p:hf hdr="0"/>
   <p:txStyles>
     <p:titleStyle>
       <a:lvl1pPr algn="l" defTabSz="457200" rtl="0" eaLnBrk="1" latinLnBrk="0" hangingPunct="1">
@@ -7166,11 +7466,7 @@
           <a:p>
             <a:r>
               <a:rPr lang="fr-CH" dirty="0" smtClean="0"/>
-              <a:t>Timothée </a:t>
-            </a:r>
-            <a:r>
-              <a:rPr lang="fr-CH" dirty="0" err="1" smtClean="0"/>
-              <a:t>Guggisberg</a:t>
+              <a:t>Timothée Guggisberg</a:t>
             </a:r>
             <a:endParaRPr lang="fr-CH" dirty="0"/>
           </a:p>
@@ -7301,6 +7597,79 @@
           </a:ln>
         </p:spPr>
       </p:pic>
+      <p:sp>
+        <p:nvSpPr>
+          <p:cNvPr id="3" name="Espace réservé de la date 2"/>
+          <p:cNvSpPr>
+            <a:spLocks noGrp="1"/>
+          </p:cNvSpPr>
+          <p:nvPr>
+            <p:ph type="dt" sz="half" idx="10"/>
+          </p:nvPr>
+        </p:nvSpPr>
+        <p:spPr/>
+        <p:txBody>
+          <a:bodyPr/>
+          <a:lstStyle/>
+          <a:p>
+            <a:fld id="{2005C19C-AD28-4A7E-8E7B-8BE732F38EEF}" type="datetime1">
+              <a:rPr lang="fr-CH" smtClean="0"/>
+              <a:t>26.06.2017</a:t>
+            </a:fld>
+            <a:endParaRPr lang="en-US" dirty="0"/>
+          </a:p>
+        </p:txBody>
+      </p:sp>
+      <p:sp>
+        <p:nvSpPr>
+          <p:cNvPr id="6" name="Espace réservé du numéro de diapositive 5"/>
+          <p:cNvSpPr>
+            <a:spLocks noGrp="1"/>
+          </p:cNvSpPr>
+          <p:nvPr>
+            <p:ph type="sldNum" sz="quarter" idx="12"/>
+          </p:nvPr>
+        </p:nvSpPr>
+        <p:spPr/>
+        <p:txBody>
+          <a:bodyPr/>
+          <a:lstStyle/>
+          <a:p>
+            <a:fld id="{519954A3-9DFD-4C44-94BA-B95130A3BA1C}" type="slidenum">
+              <a:rPr lang="en-US" smtClean="0"/>
+              <a:t>10</a:t>
+            </a:fld>
+            <a:r>
+              <a:rPr lang="en-US" dirty="0" smtClean="0"/>
+              <a:t>/21</a:t>
+            </a:r>
+            <a:endParaRPr lang="en-US" dirty="0"/>
+          </a:p>
+        </p:txBody>
+      </p:sp>
+      <p:sp>
+        <p:nvSpPr>
+          <p:cNvPr id="9" name="Espace réservé du pied de page 8"/>
+          <p:cNvSpPr>
+            <a:spLocks noGrp="1"/>
+          </p:cNvSpPr>
+          <p:nvPr>
+            <p:ph type="ftr" sz="quarter" idx="11"/>
+          </p:nvPr>
+        </p:nvSpPr>
+        <p:spPr/>
+        <p:txBody>
+          <a:bodyPr/>
+          <a:lstStyle/>
+          <a:p>
+            <a:r>
+              <a:rPr lang="en-US" smtClean="0"/>
+              <a:t>Timothée Guggisberg</a:t>
+            </a:r>
+            <a:endParaRPr lang="en-US" dirty="0"/>
+          </a:p>
+        </p:txBody>
+      </p:sp>
     </p:spTree>
     <p:extLst>
       <p:ext uri="{BB962C8B-B14F-4D97-AF65-F5344CB8AC3E}">
@@ -7399,6 +7768,79 @@
           </a:p>
         </p:txBody>
       </p:sp>
+      <p:sp>
+        <p:nvSpPr>
+          <p:cNvPr id="2" name="Espace réservé de la date 1"/>
+          <p:cNvSpPr>
+            <a:spLocks noGrp="1"/>
+          </p:cNvSpPr>
+          <p:nvPr>
+            <p:ph type="dt" sz="half" idx="10"/>
+          </p:nvPr>
+        </p:nvSpPr>
+        <p:spPr/>
+        <p:txBody>
+          <a:bodyPr/>
+          <a:lstStyle/>
+          <a:p>
+            <a:fld id="{7AF6E548-054D-4A3D-B41D-5F7E4A279F8B}" type="datetime1">
+              <a:rPr lang="fr-CH" smtClean="0"/>
+              <a:t>26.06.2017</a:t>
+            </a:fld>
+            <a:endParaRPr lang="en-US" dirty="0"/>
+          </a:p>
+        </p:txBody>
+      </p:sp>
+      <p:sp>
+        <p:nvSpPr>
+          <p:cNvPr id="3" name="Espace réservé du numéro de diapositive 2"/>
+          <p:cNvSpPr>
+            <a:spLocks noGrp="1"/>
+          </p:cNvSpPr>
+          <p:nvPr>
+            <p:ph type="sldNum" sz="quarter" idx="12"/>
+          </p:nvPr>
+        </p:nvSpPr>
+        <p:spPr/>
+        <p:txBody>
+          <a:bodyPr/>
+          <a:lstStyle/>
+          <a:p>
+            <a:fld id="{519954A3-9DFD-4C44-94BA-B95130A3BA1C}" type="slidenum">
+              <a:rPr lang="en-US" smtClean="0"/>
+              <a:t>11</a:t>
+            </a:fld>
+            <a:r>
+              <a:rPr lang="en-US" dirty="0" smtClean="0"/>
+              <a:t>/21</a:t>
+            </a:r>
+            <a:endParaRPr lang="en-US" dirty="0"/>
+          </a:p>
+        </p:txBody>
+      </p:sp>
+      <p:sp>
+        <p:nvSpPr>
+          <p:cNvPr id="8" name="Espace réservé du pied de page 7"/>
+          <p:cNvSpPr>
+            <a:spLocks noGrp="1"/>
+          </p:cNvSpPr>
+          <p:nvPr>
+            <p:ph type="ftr" sz="quarter" idx="11"/>
+          </p:nvPr>
+        </p:nvSpPr>
+        <p:spPr/>
+        <p:txBody>
+          <a:bodyPr/>
+          <a:lstStyle/>
+          <a:p>
+            <a:r>
+              <a:rPr lang="en-US" smtClean="0"/>
+              <a:t>Timothée Guggisberg</a:t>
+            </a:r>
+            <a:endParaRPr lang="en-US" dirty="0"/>
+          </a:p>
+        </p:txBody>
+      </p:sp>
     </p:spTree>
     <p:extLst>
       <p:ext uri="{BB962C8B-B14F-4D97-AF65-F5344CB8AC3E}">
@@ -7469,15 +7911,25 @@
             <p:ph idx="1"/>
           </p:nvPr>
         </p:nvSpPr>
-        <p:spPr/>
+        <p:spPr>
+          <a:xfrm>
+            <a:off x="677334" y="2160589"/>
+            <a:ext cx="8596668" cy="3880773"/>
+          </a:xfrm>
+        </p:spPr>
         <p:txBody>
           <a:bodyPr/>
           <a:lstStyle/>
           <a:p>
             <a:r>
               <a:rPr lang="fr-CH" dirty="0" smtClean="0"/>
-              <a:t>5 Formulaire</a:t>
-            </a:r>
+              <a:t>5 </a:t>
+            </a:r>
+            <a:r>
+              <a:rPr lang="fr-CH" dirty="0" smtClean="0"/>
+              <a:t>Formulaires</a:t>
+            </a:r>
+            <a:endParaRPr lang="fr-CH" dirty="0" smtClean="0"/>
           </a:p>
           <a:p>
             <a:pPr lvl="1"/>
@@ -7520,6 +7972,79 @@
               <a:t>Regex</a:t>
             </a:r>
             <a:endParaRPr lang="fr-CH" dirty="0" smtClean="0"/>
+          </a:p>
+        </p:txBody>
+      </p:sp>
+      <p:sp>
+        <p:nvSpPr>
+          <p:cNvPr id="4" name="Espace réservé de la date 3"/>
+          <p:cNvSpPr>
+            <a:spLocks noGrp="1"/>
+          </p:cNvSpPr>
+          <p:nvPr>
+            <p:ph type="dt" sz="half" idx="10"/>
+          </p:nvPr>
+        </p:nvSpPr>
+        <p:spPr/>
+        <p:txBody>
+          <a:bodyPr/>
+          <a:lstStyle/>
+          <a:p>
+            <a:fld id="{77034A2A-8974-4251-A881-2FA97618C091}" type="datetime1">
+              <a:rPr lang="fr-CH" smtClean="0"/>
+              <a:t>26.06.2017</a:t>
+            </a:fld>
+            <a:endParaRPr lang="en-US" dirty="0"/>
+          </a:p>
+        </p:txBody>
+      </p:sp>
+      <p:sp>
+        <p:nvSpPr>
+          <p:cNvPr id="5" name="Espace réservé du numéro de diapositive 4"/>
+          <p:cNvSpPr>
+            <a:spLocks noGrp="1"/>
+          </p:cNvSpPr>
+          <p:nvPr>
+            <p:ph type="sldNum" sz="quarter" idx="12"/>
+          </p:nvPr>
+        </p:nvSpPr>
+        <p:spPr/>
+        <p:txBody>
+          <a:bodyPr/>
+          <a:lstStyle/>
+          <a:p>
+            <a:fld id="{519954A3-9DFD-4C44-94BA-B95130A3BA1C}" type="slidenum">
+              <a:rPr lang="en-US" smtClean="0"/>
+              <a:t>12</a:t>
+            </a:fld>
+            <a:r>
+              <a:rPr lang="en-US" dirty="0" smtClean="0"/>
+              <a:t>/21</a:t>
+            </a:r>
+            <a:endParaRPr lang="en-US" dirty="0"/>
+          </a:p>
+        </p:txBody>
+      </p:sp>
+      <p:sp>
+        <p:nvSpPr>
+          <p:cNvPr id="8" name="Espace réservé du pied de page 7"/>
+          <p:cNvSpPr>
+            <a:spLocks noGrp="1"/>
+          </p:cNvSpPr>
+          <p:nvPr>
+            <p:ph type="ftr" sz="quarter" idx="11"/>
+          </p:nvPr>
+        </p:nvSpPr>
+        <p:spPr/>
+        <p:txBody>
+          <a:bodyPr/>
+          <a:lstStyle/>
+          <a:p>
+            <a:r>
+              <a:rPr lang="en-US" smtClean="0"/>
+              <a:t>Timothée Guggisberg</a:t>
+            </a:r>
+            <a:endParaRPr lang="en-US" dirty="0"/>
           </a:p>
         </p:txBody>
       </p:sp>
@@ -7659,6 +8184,79 @@
           </a:prstGeom>
         </p:spPr>
       </p:pic>
+      <p:sp>
+        <p:nvSpPr>
+          <p:cNvPr id="5" name="Espace réservé de la date 4"/>
+          <p:cNvSpPr>
+            <a:spLocks noGrp="1"/>
+          </p:cNvSpPr>
+          <p:nvPr>
+            <p:ph type="dt" sz="half" idx="10"/>
+          </p:nvPr>
+        </p:nvSpPr>
+        <p:spPr/>
+        <p:txBody>
+          <a:bodyPr/>
+          <a:lstStyle/>
+          <a:p>
+            <a:fld id="{0876AF2B-84E5-4974-94AF-E2095DC0396C}" type="datetime1">
+              <a:rPr lang="fr-CH" smtClean="0"/>
+              <a:t>26.06.2017</a:t>
+            </a:fld>
+            <a:endParaRPr lang="en-US" dirty="0"/>
+          </a:p>
+        </p:txBody>
+      </p:sp>
+      <p:sp>
+        <p:nvSpPr>
+          <p:cNvPr id="6" name="Espace réservé du numéro de diapositive 5"/>
+          <p:cNvSpPr>
+            <a:spLocks noGrp="1"/>
+          </p:cNvSpPr>
+          <p:nvPr>
+            <p:ph type="sldNum" sz="quarter" idx="12"/>
+          </p:nvPr>
+        </p:nvSpPr>
+        <p:spPr/>
+        <p:txBody>
+          <a:bodyPr/>
+          <a:lstStyle/>
+          <a:p>
+            <a:fld id="{519954A3-9DFD-4C44-94BA-B95130A3BA1C}" type="slidenum">
+              <a:rPr lang="en-US" smtClean="0"/>
+              <a:t>13</a:t>
+            </a:fld>
+            <a:r>
+              <a:rPr lang="en-US" dirty="0" smtClean="0"/>
+              <a:t>/21</a:t>
+            </a:r>
+            <a:endParaRPr lang="en-US" dirty="0"/>
+          </a:p>
+        </p:txBody>
+      </p:sp>
+      <p:sp>
+        <p:nvSpPr>
+          <p:cNvPr id="9" name="Espace réservé du pied de page 8"/>
+          <p:cNvSpPr>
+            <a:spLocks noGrp="1"/>
+          </p:cNvSpPr>
+          <p:nvPr>
+            <p:ph type="ftr" sz="quarter" idx="11"/>
+          </p:nvPr>
+        </p:nvSpPr>
+        <p:spPr/>
+        <p:txBody>
+          <a:bodyPr/>
+          <a:lstStyle/>
+          <a:p>
+            <a:r>
+              <a:rPr lang="en-US" smtClean="0"/>
+              <a:t>Timothée Guggisberg</a:t>
+            </a:r>
+            <a:endParaRPr lang="en-US" dirty="0"/>
+          </a:p>
+        </p:txBody>
+      </p:sp>
     </p:spTree>
     <p:extLst>
       <p:ext uri="{BB962C8B-B14F-4D97-AF65-F5344CB8AC3E}">
@@ -7804,6 +8402,79 @@
           </a:prstGeom>
         </p:spPr>
       </p:pic>
+      <p:sp>
+        <p:nvSpPr>
+          <p:cNvPr id="5" name="Espace réservé de la date 4"/>
+          <p:cNvSpPr>
+            <a:spLocks noGrp="1"/>
+          </p:cNvSpPr>
+          <p:nvPr>
+            <p:ph type="dt" sz="half" idx="10"/>
+          </p:nvPr>
+        </p:nvSpPr>
+        <p:spPr/>
+        <p:txBody>
+          <a:bodyPr/>
+          <a:lstStyle/>
+          <a:p>
+            <a:fld id="{90DC92B2-FDB6-4D21-B215-CF72F08EF533}" type="datetime1">
+              <a:rPr lang="fr-CH" smtClean="0"/>
+              <a:t>26.06.2017</a:t>
+            </a:fld>
+            <a:endParaRPr lang="en-US" dirty="0"/>
+          </a:p>
+        </p:txBody>
+      </p:sp>
+      <p:sp>
+        <p:nvSpPr>
+          <p:cNvPr id="6" name="Espace réservé du numéro de diapositive 5"/>
+          <p:cNvSpPr>
+            <a:spLocks noGrp="1"/>
+          </p:cNvSpPr>
+          <p:nvPr>
+            <p:ph type="sldNum" sz="quarter" idx="12"/>
+          </p:nvPr>
+        </p:nvSpPr>
+        <p:spPr/>
+        <p:txBody>
+          <a:bodyPr/>
+          <a:lstStyle/>
+          <a:p>
+            <a:fld id="{519954A3-9DFD-4C44-94BA-B95130A3BA1C}" type="slidenum">
+              <a:rPr lang="en-US" smtClean="0"/>
+              <a:t>14</a:t>
+            </a:fld>
+            <a:r>
+              <a:rPr lang="en-US" dirty="0" smtClean="0"/>
+              <a:t>/21</a:t>
+            </a:r>
+            <a:endParaRPr lang="en-US" dirty="0"/>
+          </a:p>
+        </p:txBody>
+      </p:sp>
+      <p:sp>
+        <p:nvSpPr>
+          <p:cNvPr id="9" name="Espace réservé du pied de page 8"/>
+          <p:cNvSpPr>
+            <a:spLocks noGrp="1"/>
+          </p:cNvSpPr>
+          <p:nvPr>
+            <p:ph type="ftr" sz="quarter" idx="11"/>
+          </p:nvPr>
+        </p:nvSpPr>
+        <p:spPr/>
+        <p:txBody>
+          <a:bodyPr/>
+          <a:lstStyle/>
+          <a:p>
+            <a:r>
+              <a:rPr lang="en-US" smtClean="0"/>
+              <a:t>Timothée Guggisberg</a:t>
+            </a:r>
+            <a:endParaRPr lang="en-US" dirty="0"/>
+          </a:p>
+        </p:txBody>
+      </p:sp>
     </p:spTree>
     <p:extLst>
       <p:ext uri="{BB962C8B-B14F-4D97-AF65-F5344CB8AC3E}">
@@ -7887,7 +8558,15 @@
           <a:p>
             <a:r>
               <a:rPr lang="fr-CH" dirty="0" smtClean="0"/>
-              <a:t>Démo à d’autre personnes</a:t>
+              <a:t>Démo à </a:t>
+            </a:r>
+            <a:r>
+              <a:rPr lang="fr-CH" dirty="0" smtClean="0"/>
+              <a:t>d’autres </a:t>
+            </a:r>
+            <a:r>
+              <a:rPr lang="fr-CH" dirty="0" smtClean="0"/>
+              <a:t>personnes</a:t>
             </a:r>
           </a:p>
           <a:p>
@@ -7900,6 +8579,79 @@
               <a:t> Data</a:t>
             </a:r>
             <a:endParaRPr lang="fr-CH" dirty="0"/>
+          </a:p>
+        </p:txBody>
+      </p:sp>
+      <p:sp>
+        <p:nvSpPr>
+          <p:cNvPr id="4" name="Espace réservé de la date 3"/>
+          <p:cNvSpPr>
+            <a:spLocks noGrp="1"/>
+          </p:cNvSpPr>
+          <p:nvPr>
+            <p:ph type="dt" sz="half" idx="10"/>
+          </p:nvPr>
+        </p:nvSpPr>
+        <p:spPr/>
+        <p:txBody>
+          <a:bodyPr/>
+          <a:lstStyle/>
+          <a:p>
+            <a:fld id="{CFEE25E0-565C-4518-A355-2955F60488BD}" type="datetime1">
+              <a:rPr lang="fr-CH" smtClean="0"/>
+              <a:t>26.06.2017</a:t>
+            </a:fld>
+            <a:endParaRPr lang="en-US" dirty="0"/>
+          </a:p>
+        </p:txBody>
+      </p:sp>
+      <p:sp>
+        <p:nvSpPr>
+          <p:cNvPr id="5" name="Espace réservé du numéro de diapositive 4"/>
+          <p:cNvSpPr>
+            <a:spLocks noGrp="1"/>
+          </p:cNvSpPr>
+          <p:nvPr>
+            <p:ph type="sldNum" sz="quarter" idx="12"/>
+          </p:nvPr>
+        </p:nvSpPr>
+        <p:spPr/>
+        <p:txBody>
+          <a:bodyPr/>
+          <a:lstStyle/>
+          <a:p>
+            <a:fld id="{519954A3-9DFD-4C44-94BA-B95130A3BA1C}" type="slidenum">
+              <a:rPr lang="en-US" smtClean="0"/>
+              <a:t>15</a:t>
+            </a:fld>
+            <a:r>
+              <a:rPr lang="en-US" dirty="0" smtClean="0"/>
+              <a:t>/21</a:t>
+            </a:r>
+            <a:endParaRPr lang="en-US" dirty="0"/>
+          </a:p>
+        </p:txBody>
+      </p:sp>
+      <p:sp>
+        <p:nvSpPr>
+          <p:cNvPr id="8" name="Espace réservé du pied de page 7"/>
+          <p:cNvSpPr>
+            <a:spLocks noGrp="1"/>
+          </p:cNvSpPr>
+          <p:nvPr>
+            <p:ph type="ftr" sz="quarter" idx="11"/>
+          </p:nvPr>
+        </p:nvSpPr>
+        <p:spPr/>
+        <p:txBody>
+          <a:bodyPr/>
+          <a:lstStyle/>
+          <a:p>
+            <a:r>
+              <a:rPr lang="en-US" smtClean="0"/>
+              <a:t>Timothée Guggisberg</a:t>
+            </a:r>
+            <a:endParaRPr lang="en-US" dirty="0"/>
           </a:p>
         </p:txBody>
       </p:sp>
@@ -7992,9 +8744,91 @@
           <a:p>
             <a:r>
               <a:rPr lang="fr-CH" dirty="0" smtClean="0"/>
-              <a:t>Bug : Présentation du chalet</a:t>
-            </a:r>
+              <a:t>Bug : Présentation du </a:t>
+            </a:r>
+            <a:r>
+              <a:rPr lang="fr-CH" dirty="0" smtClean="0"/>
+              <a:t>chalet</a:t>
+            </a:r>
+          </a:p>
+          <a:p>
+            <a:pPr marL="0" indent="0">
+              <a:buNone/>
+            </a:pPr>
             <a:endParaRPr lang="fr-CH" dirty="0"/>
+          </a:p>
+        </p:txBody>
+      </p:sp>
+      <p:sp>
+        <p:nvSpPr>
+          <p:cNvPr id="4" name="Espace réservé de la date 3"/>
+          <p:cNvSpPr>
+            <a:spLocks noGrp="1"/>
+          </p:cNvSpPr>
+          <p:nvPr>
+            <p:ph type="dt" sz="half" idx="10"/>
+          </p:nvPr>
+        </p:nvSpPr>
+        <p:spPr/>
+        <p:txBody>
+          <a:bodyPr/>
+          <a:lstStyle/>
+          <a:p>
+            <a:fld id="{2C5632F3-141C-4D7B-8608-07937BA135D4}" type="datetime1">
+              <a:rPr lang="fr-CH" smtClean="0"/>
+              <a:t>26.06.2017</a:t>
+            </a:fld>
+            <a:endParaRPr lang="en-US" dirty="0"/>
+          </a:p>
+        </p:txBody>
+      </p:sp>
+      <p:sp>
+        <p:nvSpPr>
+          <p:cNvPr id="5" name="Espace réservé du numéro de diapositive 4"/>
+          <p:cNvSpPr>
+            <a:spLocks noGrp="1"/>
+          </p:cNvSpPr>
+          <p:nvPr>
+            <p:ph type="sldNum" sz="quarter" idx="12"/>
+          </p:nvPr>
+        </p:nvSpPr>
+        <p:spPr/>
+        <p:txBody>
+          <a:bodyPr/>
+          <a:lstStyle/>
+          <a:p>
+            <a:fld id="{519954A3-9DFD-4C44-94BA-B95130A3BA1C}" type="slidenum">
+              <a:rPr lang="en-US" smtClean="0"/>
+              <a:t>16</a:t>
+            </a:fld>
+            <a:r>
+              <a:rPr lang="en-US" dirty="0" smtClean="0"/>
+              <a:t>/21</a:t>
+            </a:r>
+            <a:endParaRPr lang="en-US" dirty="0"/>
+          </a:p>
+        </p:txBody>
+      </p:sp>
+      <p:sp>
+        <p:nvSpPr>
+          <p:cNvPr id="8" name="Espace réservé du pied de page 7"/>
+          <p:cNvSpPr>
+            <a:spLocks noGrp="1"/>
+          </p:cNvSpPr>
+          <p:nvPr>
+            <p:ph type="ftr" sz="quarter" idx="11"/>
+          </p:nvPr>
+        </p:nvSpPr>
+        <p:spPr/>
+        <p:txBody>
+          <a:bodyPr/>
+          <a:lstStyle/>
+          <a:p>
+            <a:r>
+              <a:rPr lang="en-US" smtClean="0"/>
+              <a:t>Timothée Guggisberg</a:t>
+            </a:r>
+            <a:endParaRPr lang="en-US" dirty="0"/>
           </a:p>
         </p:txBody>
       </p:sp>
@@ -8052,7 +8886,7 @@
           <a:p>
             <a:r>
               <a:rPr lang="fr-CH" dirty="0" smtClean="0"/>
-              <a:t>Bilan</a:t>
+              <a:t>Journal de travail</a:t>
             </a:r>
             <a:endParaRPr lang="fr-CH" dirty="0"/>
           </a:p>
@@ -8060,60 +8894,124 @@
       </p:sp>
       <p:sp>
         <p:nvSpPr>
-          <p:cNvPr id="3" name="Espace réservé du contenu 2"/>
-          <p:cNvSpPr>
-            <a:spLocks noGrp="1"/>
-          </p:cNvSpPr>
-          <p:nvPr>
-            <p:ph idx="1"/>
-          </p:nvPr>
-        </p:nvSpPr>
-        <p:spPr/>
-        <p:txBody>
-          <a:bodyPr/>
-          <a:lstStyle/>
-          <a:p>
-            <a:r>
-              <a:rPr lang="fr-CH" dirty="0"/>
-              <a:t>Approfondissement des connaissances PHP</a:t>
-            </a:r>
-          </a:p>
-          <a:p>
-            <a:r>
-              <a:rPr lang="fr-CH" dirty="0"/>
-              <a:t>Utilisation d’un </a:t>
-            </a:r>
-            <a:r>
-              <a:rPr lang="fr-CH" dirty="0" smtClean="0"/>
-              <a:t>Framework</a:t>
-            </a:r>
-          </a:p>
-          <a:p>
-            <a:r>
-              <a:rPr lang="fr-CH" dirty="0" smtClean="0"/>
-              <a:t>Utilisation du JavaScript</a:t>
-            </a:r>
-            <a:endParaRPr lang="fr-CH" dirty="0"/>
-          </a:p>
-          <a:p>
-            <a:r>
-              <a:rPr lang="fr-CH" dirty="0" smtClean="0"/>
-              <a:t>Travail seul</a:t>
-            </a:r>
-            <a:endParaRPr lang="fr-CH" dirty="0"/>
+          <p:cNvPr id="4" name="Espace réservé de la date 3"/>
+          <p:cNvSpPr>
+            <a:spLocks noGrp="1"/>
+          </p:cNvSpPr>
+          <p:nvPr>
+            <p:ph type="dt" sz="half" idx="10"/>
+          </p:nvPr>
+        </p:nvSpPr>
+        <p:spPr/>
+        <p:txBody>
+          <a:bodyPr/>
+          <a:lstStyle/>
+          <a:p>
+            <a:fld id="{374C3F54-DCA7-4AEA-A943-A34705F51C3D}" type="datetime1">
+              <a:rPr lang="fr-CH" smtClean="0"/>
+              <a:t>26.06.2017</a:t>
+            </a:fld>
+            <a:endParaRPr lang="en-US" dirty="0"/>
+          </a:p>
+        </p:txBody>
+      </p:sp>
+      <p:sp>
+        <p:nvSpPr>
+          <p:cNvPr id="5" name="Espace réservé du numéro de diapositive 4"/>
+          <p:cNvSpPr>
+            <a:spLocks noGrp="1"/>
+          </p:cNvSpPr>
+          <p:nvPr>
+            <p:ph type="sldNum" sz="quarter" idx="12"/>
+          </p:nvPr>
+        </p:nvSpPr>
+        <p:spPr/>
+        <p:txBody>
+          <a:bodyPr/>
+          <a:lstStyle/>
+          <a:p>
+            <a:fld id="{519954A3-9DFD-4C44-94BA-B95130A3BA1C}" type="slidenum">
+              <a:rPr lang="en-US" smtClean="0"/>
+              <a:t>17</a:t>
+            </a:fld>
+            <a:r>
+              <a:rPr lang="en-US" dirty="0"/>
+              <a:t>/21</a:t>
+            </a:r>
+            <a:endParaRPr lang="en-US" dirty="0"/>
+          </a:p>
+        </p:txBody>
+      </p:sp>
+      <p:pic>
+        <p:nvPicPr>
+          <p:cNvPr id="6" name="Image 5"/>
+          <p:cNvPicPr>
+            <a:picLocks noChangeAspect="1"/>
+          </p:cNvPicPr>
+          <p:nvPr/>
+        </p:nvPicPr>
+        <p:blipFill>
+          <a:blip r:embed="rId2">
+            <a:extLst>
+              <a:ext uri="{28A0092B-C50C-407E-A947-70E740481C1C}">
+                <a14:useLocalDpi xmlns:a14="http://schemas.microsoft.com/office/drawing/2010/main" val="0"/>
+              </a:ext>
+            </a:extLst>
+          </a:blip>
+          <a:stretch>
+            <a:fillRect/>
+          </a:stretch>
+        </p:blipFill>
+        <p:spPr>
+          <a:xfrm>
+            <a:off x="335664" y="1388872"/>
+            <a:ext cx="11603069" cy="4458322"/>
+          </a:xfrm>
+          <a:prstGeom prst="rect">
+            <a:avLst/>
+          </a:prstGeom>
+        </p:spPr>
+      </p:pic>
+      <p:sp>
+        <p:nvSpPr>
+          <p:cNvPr id="8" name="Espace réservé du pied de page 7"/>
+          <p:cNvSpPr>
+            <a:spLocks noGrp="1"/>
+          </p:cNvSpPr>
+          <p:nvPr>
+            <p:ph type="ftr" sz="quarter" idx="11"/>
+          </p:nvPr>
+        </p:nvSpPr>
+        <p:spPr/>
+        <p:txBody>
+          <a:bodyPr/>
+          <a:lstStyle/>
+          <a:p>
+            <a:r>
+              <a:rPr lang="en-US" smtClean="0"/>
+              <a:t>Timothée Guggisberg</a:t>
+            </a:r>
+            <a:endParaRPr lang="en-US" dirty="0"/>
           </a:p>
         </p:txBody>
       </p:sp>
     </p:spTree>
     <p:extLst>
       <p:ext uri="{BB962C8B-B14F-4D97-AF65-F5344CB8AC3E}">
-        <p14:creationId xmlns:p14="http://schemas.microsoft.com/office/powerpoint/2010/main" val="2660131456"/>
+        <p14:creationId xmlns:p14="http://schemas.microsoft.com/office/powerpoint/2010/main" val="2599294787"/>
       </p:ext>
     </p:extLst>
   </p:cSld>
   <p:clrMapOvr>
     <a:masterClrMapping/>
   </p:clrMapOvr>
+  <p:timing>
+    <p:tnLst>
+      <p:par>
+        <p:cTn id="1" dur="indefinite" restart="never" nodeType="tmRoot"/>
+      </p:par>
+    </p:tnLst>
+  </p:timing>
 </p:sld>
 </file>
 
@@ -8136,60 +9034,111 @@
       </p:grpSpPr>
       <p:sp>
         <p:nvSpPr>
-          <p:cNvPr id="2" name="Titre 1"/>
-          <p:cNvSpPr>
-            <a:spLocks noGrp="1"/>
-          </p:cNvSpPr>
-          <p:nvPr>
-            <p:ph type="title"/>
-          </p:nvPr>
-        </p:nvSpPr>
-        <p:spPr/>
-        <p:txBody>
-          <a:bodyPr/>
-          <a:lstStyle/>
-          <a:p>
-            <a:r>
-              <a:rPr lang="fr-CH" dirty="0" smtClean="0"/>
-              <a:t>Conclusion</a:t>
-            </a:r>
-            <a:endParaRPr lang="fr-CH" dirty="0"/>
-          </a:p>
-        </p:txBody>
-      </p:sp>
-      <p:sp>
-        <p:nvSpPr>
-          <p:cNvPr id="3" name="Espace réservé du contenu 2"/>
-          <p:cNvSpPr>
-            <a:spLocks noGrp="1"/>
-          </p:cNvSpPr>
-          <p:nvPr>
-            <p:ph idx="1"/>
-          </p:nvPr>
-        </p:nvSpPr>
-        <p:spPr/>
-        <p:txBody>
-          <a:bodyPr/>
-          <a:lstStyle/>
-          <a:p>
-            <a:r>
-              <a:rPr lang="fr-CH" dirty="0" smtClean="0"/>
-              <a:t>Projet fini ?</a:t>
-            </a:r>
-          </a:p>
-          <a:p>
-            <a:r>
-              <a:rPr lang="fr-CH" dirty="0" smtClean="0"/>
-              <a:t>Conclusion personnelle</a:t>
-            </a:r>
-            <a:endParaRPr lang="fr-CH" dirty="0"/>
+          <p:cNvPr id="4" name="Espace réservé de la date 3"/>
+          <p:cNvSpPr>
+            <a:spLocks noGrp="1"/>
+          </p:cNvSpPr>
+          <p:nvPr>
+            <p:ph type="dt" sz="half" idx="10"/>
+          </p:nvPr>
+        </p:nvSpPr>
+        <p:spPr/>
+        <p:txBody>
+          <a:bodyPr/>
+          <a:lstStyle/>
+          <a:p>
+            <a:fld id="{5CE182FD-C2BB-4BAD-B6C5-CDAE538D2274}" type="datetime1">
+              <a:rPr lang="fr-CH" smtClean="0"/>
+              <a:t>26.06.2017</a:t>
+            </a:fld>
+            <a:endParaRPr lang="en-US" dirty="0"/>
+          </a:p>
+        </p:txBody>
+      </p:sp>
+      <p:sp>
+        <p:nvSpPr>
+          <p:cNvPr id="5" name="Espace réservé du numéro de diapositive 4"/>
+          <p:cNvSpPr>
+            <a:spLocks noGrp="1"/>
+          </p:cNvSpPr>
+          <p:nvPr>
+            <p:ph type="sldNum" sz="quarter" idx="12"/>
+          </p:nvPr>
+        </p:nvSpPr>
+        <p:spPr/>
+        <p:txBody>
+          <a:bodyPr/>
+          <a:lstStyle/>
+          <a:p>
+            <a:fld id="{519954A3-9DFD-4C44-94BA-B95130A3BA1C}" type="slidenum">
+              <a:rPr lang="en-US" smtClean="0"/>
+              <a:t>18</a:t>
+            </a:fld>
+            <a:r>
+              <a:rPr lang="en-US" dirty="0"/>
+              <a:t>/21</a:t>
+            </a:r>
+            <a:endParaRPr lang="en-US" dirty="0"/>
+          </a:p>
+        </p:txBody>
+      </p:sp>
+      <p:pic>
+        <p:nvPicPr>
+          <p:cNvPr id="6" name="Image 5"/>
+          <p:cNvPicPr>
+            <a:picLocks noChangeAspect="1"/>
+          </p:cNvPicPr>
+          <p:nvPr/>
+        </p:nvPicPr>
+        <p:blipFill>
+          <a:blip r:embed="rId2">
+            <a:extLst>
+              <a:ext uri="{28A0092B-C50C-407E-A947-70E740481C1C}">
+                <a14:useLocalDpi xmlns:a14="http://schemas.microsoft.com/office/drawing/2010/main" val="0"/>
+              </a:ext>
+            </a:extLst>
+          </a:blip>
+          <a:stretch>
+            <a:fillRect/>
+          </a:stretch>
+        </p:blipFill>
+        <p:spPr>
+          <a:xfrm>
+            <a:off x="169743" y="1261872"/>
+            <a:ext cx="11603069" cy="4296375"/>
+          </a:xfrm>
+          <a:prstGeom prst="rect">
+            <a:avLst/>
+          </a:prstGeom>
+        </p:spPr>
+      </p:pic>
+      <p:sp>
+        <p:nvSpPr>
+          <p:cNvPr id="7" name="Espace réservé du pied de page 6"/>
+          <p:cNvSpPr>
+            <a:spLocks noGrp="1"/>
+          </p:cNvSpPr>
+          <p:nvPr>
+            <p:ph type="ftr" sz="quarter" idx="11"/>
+          </p:nvPr>
+        </p:nvSpPr>
+        <p:spPr/>
+        <p:txBody>
+          <a:bodyPr/>
+          <a:lstStyle/>
+          <a:p>
+            <a:r>
+              <a:rPr lang="en-US" smtClean="0"/>
+              <a:t>Timothée Guggisberg</a:t>
+            </a:r>
+            <a:endParaRPr lang="en-US" dirty="0"/>
           </a:p>
         </p:txBody>
       </p:sp>
     </p:spTree>
     <p:extLst>
       <p:ext uri="{BB962C8B-B14F-4D97-AF65-F5344CB8AC3E}">
-        <p14:creationId xmlns:p14="http://schemas.microsoft.com/office/powerpoint/2010/main" val="2666547859"/>
+        <p14:creationId xmlns:p14="http://schemas.microsoft.com/office/powerpoint/2010/main" val="2783676231"/>
       </p:ext>
     </p:extLst>
   </p:cSld>
@@ -8233,30 +9182,142 @@
             <p:ph type="title"/>
           </p:nvPr>
         </p:nvSpPr>
-        <p:spPr>
-          <a:xfrm>
-            <a:off x="759630" y="2795016"/>
-            <a:ext cx="8596668" cy="1320800"/>
-          </a:xfrm>
-        </p:spPr>
-        <p:txBody>
-          <a:bodyPr>
-            <a:normAutofit/>
-          </a:bodyPr>
-          <a:lstStyle/>
-          <a:p>
-            <a:r>
-              <a:rPr lang="fr-CH" sz="8000" dirty="0" smtClean="0"/>
-              <a:t>Question(s) ?</a:t>
-            </a:r>
-            <a:endParaRPr lang="fr-CH" sz="8000" dirty="0"/>
+        <p:spPr/>
+        <p:txBody>
+          <a:bodyPr/>
+          <a:lstStyle/>
+          <a:p>
+            <a:r>
+              <a:rPr lang="fr-CH" dirty="0" smtClean="0"/>
+              <a:t>Bilan</a:t>
+            </a:r>
+            <a:endParaRPr lang="fr-CH" dirty="0"/>
+          </a:p>
+        </p:txBody>
+      </p:sp>
+      <p:sp>
+        <p:nvSpPr>
+          <p:cNvPr id="3" name="Espace réservé du contenu 2"/>
+          <p:cNvSpPr>
+            <a:spLocks noGrp="1"/>
+          </p:cNvSpPr>
+          <p:nvPr>
+            <p:ph idx="1"/>
+          </p:nvPr>
+        </p:nvSpPr>
+        <p:spPr/>
+        <p:txBody>
+          <a:bodyPr/>
+          <a:lstStyle/>
+          <a:p>
+            <a:r>
+              <a:rPr lang="fr-CH" dirty="0"/>
+              <a:t>Approfondissement des connaissances PHP</a:t>
+            </a:r>
+          </a:p>
+          <a:p>
+            <a:r>
+              <a:rPr lang="fr-CH" dirty="0"/>
+              <a:t>Utilisation d’un </a:t>
+            </a:r>
+            <a:r>
+              <a:rPr lang="fr-CH" dirty="0" smtClean="0"/>
+              <a:t>Framework</a:t>
+            </a:r>
+          </a:p>
+          <a:p>
+            <a:r>
+              <a:rPr lang="fr-CH" dirty="0" smtClean="0"/>
+              <a:t>Utilisation du JavaScript</a:t>
+            </a:r>
+            <a:endParaRPr lang="fr-CH" dirty="0"/>
+          </a:p>
+          <a:p>
+            <a:r>
+              <a:rPr lang="fr-CH" dirty="0" smtClean="0"/>
+              <a:t>Travail seul</a:t>
+            </a:r>
+            <a:endParaRPr lang="fr-CH" dirty="0"/>
+          </a:p>
+        </p:txBody>
+      </p:sp>
+      <p:sp>
+        <p:nvSpPr>
+          <p:cNvPr id="4" name="Espace réservé de la date 3"/>
+          <p:cNvSpPr>
+            <a:spLocks noGrp="1"/>
+          </p:cNvSpPr>
+          <p:nvPr>
+            <p:ph type="dt" sz="half" idx="10"/>
+          </p:nvPr>
+        </p:nvSpPr>
+        <p:spPr/>
+        <p:txBody>
+          <a:bodyPr/>
+          <a:lstStyle/>
+          <a:p>
+            <a:fld id="{56C4EE15-ED9C-45C6-98EA-B8D3478276E4}" type="datetime1">
+              <a:rPr lang="fr-CH" smtClean="0"/>
+              <a:t>26.06.2017</a:t>
+            </a:fld>
+            <a:endParaRPr lang="en-US" dirty="0"/>
+          </a:p>
+        </p:txBody>
+      </p:sp>
+      <p:sp>
+        <p:nvSpPr>
+          <p:cNvPr id="5" name="Espace réservé du numéro de diapositive 4"/>
+          <p:cNvSpPr>
+            <a:spLocks noGrp="1"/>
+          </p:cNvSpPr>
+          <p:nvPr>
+            <p:ph type="sldNum" sz="quarter" idx="12"/>
+          </p:nvPr>
+        </p:nvSpPr>
+        <p:spPr/>
+        <p:txBody>
+          <a:bodyPr/>
+          <a:lstStyle/>
+          <a:p>
+            <a:fld id="{519954A3-9DFD-4C44-94BA-B95130A3BA1C}" type="slidenum">
+              <a:rPr lang="en-US" smtClean="0"/>
+              <a:t>19</a:t>
+            </a:fld>
+            <a:r>
+              <a:rPr lang="en-US" dirty="0" smtClean="0"/>
+              <a:t>/21</a:t>
+            </a:r>
+            <a:endParaRPr lang="en-US" dirty="0"/>
+          </a:p>
+        </p:txBody>
+      </p:sp>
+      <p:sp>
+        <p:nvSpPr>
+          <p:cNvPr id="8" name="Espace réservé du pied de page 7"/>
+          <p:cNvSpPr>
+            <a:spLocks noGrp="1"/>
+          </p:cNvSpPr>
+          <p:nvPr>
+            <p:ph type="ftr" sz="quarter" idx="11"/>
+          </p:nvPr>
+        </p:nvSpPr>
+        <p:spPr/>
+        <p:txBody>
+          <a:bodyPr/>
+          <a:lstStyle/>
+          <a:p>
+            <a:r>
+              <a:rPr lang="en-US" smtClean="0"/>
+              <a:t>Timothée Guggisberg</a:t>
+            </a:r>
+            <a:endParaRPr lang="en-US" dirty="0"/>
           </a:p>
         </p:txBody>
       </p:sp>
     </p:spTree>
     <p:extLst>
       <p:ext uri="{BB962C8B-B14F-4D97-AF65-F5344CB8AC3E}">
-        <p14:creationId xmlns:p14="http://schemas.microsoft.com/office/powerpoint/2010/main" val="2337521776"/>
+        <p14:creationId xmlns:p14="http://schemas.microsoft.com/office/powerpoint/2010/main" val="2660131456"/>
       </p:ext>
     </p:extLst>
   </p:cSld>
@@ -8323,12 +9384,431 @@
             <p:ph idx="1"/>
           </p:nvPr>
         </p:nvSpPr>
-        <p:spPr/>
-        <p:txBody>
-          <a:bodyPr/>
-          <a:lstStyle/>
-          <a:p>
-            <a:endParaRPr lang="fr-CH"/>
+        <p:spPr>
+          <a:xfrm>
+            <a:off x="677334" y="2160589"/>
+            <a:ext cx="3025986" cy="3880773"/>
+          </a:xfrm>
+        </p:spPr>
+        <p:txBody>
+          <a:bodyPr/>
+          <a:lstStyle/>
+          <a:p>
+            <a:r>
+              <a:rPr lang="fr-CH" dirty="0" smtClean="0"/>
+              <a:t>Cahier des charges		</a:t>
+            </a:r>
+          </a:p>
+          <a:p>
+            <a:r>
+              <a:rPr lang="fr-CH" dirty="0" smtClean="0"/>
+              <a:t>Méthodologie</a:t>
+            </a:r>
+          </a:p>
+          <a:p>
+            <a:r>
+              <a:rPr lang="fr-CH" dirty="0" smtClean="0"/>
+              <a:t>Déroulement</a:t>
+            </a:r>
+          </a:p>
+          <a:p>
+            <a:r>
+              <a:rPr lang="fr-CH" dirty="0" smtClean="0"/>
+              <a:t>Réalisation</a:t>
+            </a:r>
+          </a:p>
+          <a:p>
+            <a:pPr lvl="1"/>
+            <a:r>
+              <a:rPr lang="fr-CH" dirty="0" smtClean="0"/>
+              <a:t>MCD – MLD</a:t>
+            </a:r>
+          </a:p>
+          <a:p>
+            <a:pPr lvl="1"/>
+            <a:r>
+              <a:rPr lang="fr-CH" dirty="0" smtClean="0"/>
+              <a:t>Design</a:t>
+            </a:r>
+          </a:p>
+          <a:p>
+            <a:pPr lvl="1"/>
+            <a:r>
+              <a:rPr lang="fr-CH" dirty="0" smtClean="0"/>
+              <a:t>Formulaire</a:t>
+            </a:r>
+          </a:p>
+          <a:p>
+            <a:pPr lvl="1"/>
+            <a:r>
+              <a:rPr lang="fr-CH" dirty="0" smtClean="0"/>
+              <a:t>Calendrier</a:t>
+            </a:r>
+          </a:p>
+          <a:p>
+            <a:pPr lvl="1"/>
+            <a:r>
+              <a:rPr lang="fr-CH" dirty="0" smtClean="0"/>
+              <a:t>Sécurité</a:t>
+            </a:r>
+          </a:p>
+          <a:p>
+            <a:pPr lvl="1"/>
+            <a:endParaRPr lang="fr-CH" dirty="0"/>
+          </a:p>
+        </p:txBody>
+      </p:sp>
+      <p:sp>
+        <p:nvSpPr>
+          <p:cNvPr id="4" name="Espace réservé du contenu 2"/>
+          <p:cNvSpPr txBox="1">
+            <a:spLocks/>
+          </p:cNvSpPr>
+          <p:nvPr/>
+        </p:nvSpPr>
+        <p:spPr>
+          <a:xfrm>
+            <a:off x="4222158" y="2160588"/>
+            <a:ext cx="3025986" cy="3880773"/>
+          </a:xfrm>
+          <a:prstGeom prst="rect">
+            <a:avLst/>
+          </a:prstGeom>
+        </p:spPr>
+        <p:txBody>
+          <a:bodyPr vert="horz" lIns="91440" tIns="45720" rIns="91440" bIns="45720" rtlCol="0">
+            <a:normAutofit/>
+          </a:bodyPr>
+          <a:lstStyle>
+            <a:lvl1pPr marL="342900" indent="-342900" algn="l" defTabSz="457200" rtl="0" eaLnBrk="1" latinLnBrk="0" hangingPunct="1">
+              <a:spcBef>
+                <a:spcPts val="1000"/>
+              </a:spcBef>
+              <a:spcAft>
+                <a:spcPts val="0"/>
+              </a:spcAft>
+              <a:buClr>
+                <a:schemeClr val="accent1"/>
+              </a:buClr>
+              <a:buSzPct val="80000"/>
+              <a:buFont typeface="Wingdings 3" charset="2"/>
+              <a:buChar char=""/>
+              <a:defRPr sz="1800" kern="1200">
+                <a:solidFill>
+                  <a:schemeClr val="tx1">
+                    <a:lumMod val="75000"/>
+                    <a:lumOff val="25000"/>
+                  </a:schemeClr>
+                </a:solidFill>
+                <a:latin typeface="+mn-lt"/>
+                <a:ea typeface="+mn-ea"/>
+                <a:cs typeface="+mn-cs"/>
+              </a:defRPr>
+            </a:lvl1pPr>
+            <a:lvl2pPr marL="742950" indent="-285750" algn="l" defTabSz="457200" rtl="0" eaLnBrk="1" latinLnBrk="0" hangingPunct="1">
+              <a:spcBef>
+                <a:spcPts val="1000"/>
+              </a:spcBef>
+              <a:spcAft>
+                <a:spcPts val="0"/>
+              </a:spcAft>
+              <a:buClr>
+                <a:schemeClr val="accent1"/>
+              </a:buClr>
+              <a:buSzPct val="80000"/>
+              <a:buFont typeface="Wingdings 3" charset="2"/>
+              <a:buChar char=""/>
+              <a:defRPr sz="1600" kern="1200">
+                <a:solidFill>
+                  <a:schemeClr val="tx1">
+                    <a:lumMod val="75000"/>
+                    <a:lumOff val="25000"/>
+                  </a:schemeClr>
+                </a:solidFill>
+                <a:latin typeface="+mn-lt"/>
+                <a:ea typeface="+mn-ea"/>
+                <a:cs typeface="+mn-cs"/>
+              </a:defRPr>
+            </a:lvl2pPr>
+            <a:lvl3pPr marL="1143000" indent="-228600" algn="l" defTabSz="457200" rtl="0" eaLnBrk="1" latinLnBrk="0" hangingPunct="1">
+              <a:spcBef>
+                <a:spcPts val="1000"/>
+              </a:spcBef>
+              <a:spcAft>
+                <a:spcPts val="0"/>
+              </a:spcAft>
+              <a:buClr>
+                <a:schemeClr val="accent1"/>
+              </a:buClr>
+              <a:buSzPct val="80000"/>
+              <a:buFont typeface="Wingdings 3" charset="2"/>
+              <a:buChar char=""/>
+              <a:defRPr sz="1400" kern="1200">
+                <a:solidFill>
+                  <a:schemeClr val="tx1">
+                    <a:lumMod val="75000"/>
+                    <a:lumOff val="25000"/>
+                  </a:schemeClr>
+                </a:solidFill>
+                <a:latin typeface="+mn-lt"/>
+                <a:ea typeface="+mn-ea"/>
+                <a:cs typeface="+mn-cs"/>
+              </a:defRPr>
+            </a:lvl3pPr>
+            <a:lvl4pPr marL="1600200" indent="-228600" algn="l" defTabSz="457200" rtl="0" eaLnBrk="1" latinLnBrk="0" hangingPunct="1">
+              <a:spcBef>
+                <a:spcPts val="1000"/>
+              </a:spcBef>
+              <a:spcAft>
+                <a:spcPts val="0"/>
+              </a:spcAft>
+              <a:buClr>
+                <a:schemeClr val="accent1"/>
+              </a:buClr>
+              <a:buSzPct val="80000"/>
+              <a:buFont typeface="Wingdings 3" charset="2"/>
+              <a:buChar char=""/>
+              <a:defRPr sz="1200" kern="1200">
+                <a:solidFill>
+                  <a:schemeClr val="tx1">
+                    <a:lumMod val="75000"/>
+                    <a:lumOff val="25000"/>
+                  </a:schemeClr>
+                </a:solidFill>
+                <a:latin typeface="+mn-lt"/>
+                <a:ea typeface="+mn-ea"/>
+                <a:cs typeface="+mn-cs"/>
+              </a:defRPr>
+            </a:lvl4pPr>
+            <a:lvl5pPr marL="2057400" indent="-228600" algn="l" defTabSz="457200" rtl="0" eaLnBrk="1" latinLnBrk="0" hangingPunct="1">
+              <a:spcBef>
+                <a:spcPts val="1000"/>
+              </a:spcBef>
+              <a:spcAft>
+                <a:spcPts val="0"/>
+              </a:spcAft>
+              <a:buClr>
+                <a:schemeClr val="accent1"/>
+              </a:buClr>
+              <a:buSzPct val="80000"/>
+              <a:buFont typeface="Wingdings 3" charset="2"/>
+              <a:buChar char=""/>
+              <a:defRPr sz="1200" kern="1200">
+                <a:solidFill>
+                  <a:schemeClr val="tx1">
+                    <a:lumMod val="75000"/>
+                    <a:lumOff val="25000"/>
+                  </a:schemeClr>
+                </a:solidFill>
+                <a:latin typeface="+mn-lt"/>
+                <a:ea typeface="+mn-ea"/>
+                <a:cs typeface="+mn-cs"/>
+              </a:defRPr>
+            </a:lvl5pPr>
+            <a:lvl6pPr marL="2514600" indent="-228600" algn="l" defTabSz="457200" rtl="0" eaLnBrk="1" latinLnBrk="0" hangingPunct="1">
+              <a:spcBef>
+                <a:spcPts val="1000"/>
+              </a:spcBef>
+              <a:spcAft>
+                <a:spcPts val="0"/>
+              </a:spcAft>
+              <a:buClr>
+                <a:schemeClr val="accent1"/>
+              </a:buClr>
+              <a:buSzPct val="80000"/>
+              <a:buFont typeface="Wingdings 3" charset="2"/>
+              <a:buChar char=""/>
+              <a:defRPr sz="1200" kern="1200">
+                <a:solidFill>
+                  <a:schemeClr val="tx1">
+                    <a:lumMod val="75000"/>
+                    <a:lumOff val="25000"/>
+                  </a:schemeClr>
+                </a:solidFill>
+                <a:latin typeface="+mn-lt"/>
+                <a:ea typeface="+mn-ea"/>
+                <a:cs typeface="+mn-cs"/>
+              </a:defRPr>
+            </a:lvl6pPr>
+            <a:lvl7pPr marL="2971800" indent="-228600" algn="l" defTabSz="457200" rtl="0" eaLnBrk="1" latinLnBrk="0" hangingPunct="1">
+              <a:spcBef>
+                <a:spcPts val="1000"/>
+              </a:spcBef>
+              <a:spcAft>
+                <a:spcPts val="0"/>
+              </a:spcAft>
+              <a:buClr>
+                <a:schemeClr val="accent1"/>
+              </a:buClr>
+              <a:buSzPct val="80000"/>
+              <a:buFont typeface="Wingdings 3" charset="2"/>
+              <a:buChar char=""/>
+              <a:defRPr sz="1200" kern="1200">
+                <a:solidFill>
+                  <a:schemeClr val="tx1">
+                    <a:lumMod val="75000"/>
+                    <a:lumOff val="25000"/>
+                  </a:schemeClr>
+                </a:solidFill>
+                <a:latin typeface="+mn-lt"/>
+                <a:ea typeface="+mn-ea"/>
+                <a:cs typeface="+mn-cs"/>
+              </a:defRPr>
+            </a:lvl7pPr>
+            <a:lvl8pPr marL="3429000" indent="-228600" algn="l" defTabSz="457200" rtl="0" eaLnBrk="1" latinLnBrk="0" hangingPunct="1">
+              <a:spcBef>
+                <a:spcPts val="1000"/>
+              </a:spcBef>
+              <a:spcAft>
+                <a:spcPts val="0"/>
+              </a:spcAft>
+              <a:buClr>
+                <a:schemeClr val="accent1"/>
+              </a:buClr>
+              <a:buSzPct val="80000"/>
+              <a:buFont typeface="Wingdings 3" charset="2"/>
+              <a:buChar char=""/>
+              <a:defRPr sz="1200" kern="1200">
+                <a:solidFill>
+                  <a:schemeClr val="tx1">
+                    <a:lumMod val="75000"/>
+                    <a:lumOff val="25000"/>
+                  </a:schemeClr>
+                </a:solidFill>
+                <a:latin typeface="+mn-lt"/>
+                <a:ea typeface="+mn-ea"/>
+                <a:cs typeface="+mn-cs"/>
+              </a:defRPr>
+            </a:lvl8pPr>
+            <a:lvl9pPr marL="3886200" indent="-228600" algn="l" defTabSz="457200" rtl="0" eaLnBrk="1" latinLnBrk="0" hangingPunct="1">
+              <a:spcBef>
+                <a:spcPts val="1000"/>
+              </a:spcBef>
+              <a:spcAft>
+                <a:spcPts val="0"/>
+              </a:spcAft>
+              <a:buClr>
+                <a:schemeClr val="accent1"/>
+              </a:buClr>
+              <a:buSzPct val="80000"/>
+              <a:buFont typeface="Wingdings 3" charset="2"/>
+              <a:buChar char=""/>
+              <a:defRPr sz="1200" kern="1200">
+                <a:solidFill>
+                  <a:schemeClr val="tx1">
+                    <a:lumMod val="75000"/>
+                    <a:lumOff val="25000"/>
+                  </a:schemeClr>
+                </a:solidFill>
+                <a:latin typeface="+mn-lt"/>
+                <a:ea typeface="+mn-ea"/>
+                <a:cs typeface="+mn-cs"/>
+              </a:defRPr>
+            </a:lvl9pPr>
+          </a:lstStyle>
+          <a:p>
+            <a:r>
+              <a:rPr lang="fr-CH" dirty="0" smtClean="0"/>
+              <a:t>Tests</a:t>
+            </a:r>
+          </a:p>
+          <a:p>
+            <a:r>
+              <a:rPr lang="fr-CH" dirty="0" smtClean="0"/>
+              <a:t>Problèmes rencontrés</a:t>
+            </a:r>
+          </a:p>
+          <a:p>
+            <a:r>
+              <a:rPr lang="fr-CH" dirty="0" smtClean="0"/>
+              <a:t>Bilan</a:t>
+            </a:r>
+          </a:p>
+          <a:p>
+            <a:r>
+              <a:rPr lang="fr-CH" dirty="0" smtClean="0"/>
+              <a:t>Conclusion</a:t>
+            </a:r>
+          </a:p>
+          <a:p>
+            <a:r>
+              <a:rPr lang="fr-CH" dirty="0" smtClean="0"/>
+              <a:t>Question(s)</a:t>
+            </a:r>
+            <a:endParaRPr lang="fr-CH" dirty="0"/>
+          </a:p>
+        </p:txBody>
+      </p:sp>
+      <p:sp>
+        <p:nvSpPr>
+          <p:cNvPr id="5" name="Espace réservé de la date 4"/>
+          <p:cNvSpPr>
+            <a:spLocks noGrp="1"/>
+          </p:cNvSpPr>
+          <p:nvPr>
+            <p:ph type="dt" sz="half" idx="10"/>
+          </p:nvPr>
+        </p:nvSpPr>
+        <p:spPr/>
+        <p:txBody>
+          <a:bodyPr/>
+          <a:lstStyle/>
+          <a:p>
+            <a:fld id="{200113D8-EE7B-4C2E-9D6B-C3CD93274FDD}" type="datetime1">
+              <a:rPr lang="fr-CH" smtClean="0"/>
+              <a:t>26.06.2017</a:t>
+            </a:fld>
+            <a:endParaRPr lang="en-US" dirty="0"/>
+          </a:p>
+        </p:txBody>
+      </p:sp>
+      <p:sp>
+        <p:nvSpPr>
+          <p:cNvPr id="6" name="Espace réservé du numéro de diapositive 5"/>
+          <p:cNvSpPr>
+            <a:spLocks noGrp="1"/>
+          </p:cNvSpPr>
+          <p:nvPr>
+            <p:ph type="sldNum" sz="quarter" idx="12"/>
+          </p:nvPr>
+        </p:nvSpPr>
+        <p:spPr/>
+        <p:txBody>
+          <a:bodyPr/>
+          <a:lstStyle/>
+          <a:p>
+            <a:fld id="{519954A3-9DFD-4C44-94BA-B95130A3BA1C}" type="slidenum">
+              <a:rPr lang="en-US" smtClean="0"/>
+              <a:t>2</a:t>
+            </a:fld>
+            <a:r>
+              <a:rPr lang="en-US" dirty="0" smtClean="0"/>
+              <a:t>/21</a:t>
+            </a:r>
+            <a:endParaRPr lang="en-US" dirty="0"/>
+          </a:p>
+        </p:txBody>
+      </p:sp>
+      <p:sp>
+        <p:nvSpPr>
+          <p:cNvPr id="9" name="Espace réservé du pied de page 8"/>
+          <p:cNvSpPr>
+            <a:spLocks noGrp="1"/>
+          </p:cNvSpPr>
+          <p:nvPr>
+            <p:ph type="ftr" sz="quarter" idx="11"/>
+          </p:nvPr>
+        </p:nvSpPr>
+        <p:spPr/>
+        <p:txBody>
+          <a:bodyPr/>
+          <a:lstStyle/>
+          <a:p>
+            <a:r>
+              <a:rPr lang="en-US" smtClean="0"/>
+              <a:t>Timothée Guggisberg</a:t>
+            </a:r>
+            <a:endParaRPr lang="en-US" dirty="0"/>
           </a:p>
         </p:txBody>
       </p:sp>
@@ -8336,6 +9816,314 @@
     <p:extLst>
       <p:ext uri="{BB962C8B-B14F-4D97-AF65-F5344CB8AC3E}">
         <p14:creationId xmlns:p14="http://schemas.microsoft.com/office/powerpoint/2010/main" val="3556712572"/>
+      </p:ext>
+    </p:extLst>
+  </p:cSld>
+  <p:clrMapOvr>
+    <a:masterClrMapping/>
+  </p:clrMapOvr>
+  <p:timing>
+    <p:tnLst>
+      <p:par>
+        <p:cTn id="1" dur="indefinite" restart="never" nodeType="tmRoot"/>
+      </p:par>
+    </p:tnLst>
+  </p:timing>
+</p:sld>
+</file>
+
+<file path=ppt/slides/slide20.xml><?xml version="1.0" encoding="utf-8"?>
+<p:sld xmlns:a="http://schemas.openxmlformats.org/drawingml/2006/main" xmlns:r="http://schemas.openxmlformats.org/officeDocument/2006/relationships" xmlns:p="http://schemas.openxmlformats.org/presentationml/2006/main">
+  <p:cSld>
+    <p:spTree>
+      <p:nvGrpSpPr>
+        <p:cNvPr id="1" name=""/>
+        <p:cNvGrpSpPr/>
+        <p:nvPr/>
+      </p:nvGrpSpPr>
+      <p:grpSpPr>
+        <a:xfrm>
+          <a:off x="0" y="0"/>
+          <a:ext cx="0" cy="0"/>
+          <a:chOff x="0" y="0"/>
+          <a:chExt cx="0" cy="0"/>
+        </a:xfrm>
+      </p:grpSpPr>
+      <p:sp>
+        <p:nvSpPr>
+          <p:cNvPr id="2" name="Titre 1"/>
+          <p:cNvSpPr>
+            <a:spLocks noGrp="1"/>
+          </p:cNvSpPr>
+          <p:nvPr>
+            <p:ph type="title"/>
+          </p:nvPr>
+        </p:nvSpPr>
+        <p:spPr/>
+        <p:txBody>
+          <a:bodyPr/>
+          <a:lstStyle/>
+          <a:p>
+            <a:r>
+              <a:rPr lang="fr-CH" dirty="0" smtClean="0"/>
+              <a:t>Conclusion</a:t>
+            </a:r>
+            <a:endParaRPr lang="fr-CH" dirty="0"/>
+          </a:p>
+        </p:txBody>
+      </p:sp>
+      <p:sp>
+        <p:nvSpPr>
+          <p:cNvPr id="3" name="Espace réservé du contenu 2"/>
+          <p:cNvSpPr>
+            <a:spLocks noGrp="1"/>
+          </p:cNvSpPr>
+          <p:nvPr>
+            <p:ph idx="1"/>
+          </p:nvPr>
+        </p:nvSpPr>
+        <p:spPr/>
+        <p:txBody>
+          <a:bodyPr/>
+          <a:lstStyle/>
+          <a:p>
+            <a:r>
+              <a:rPr lang="fr-CH" dirty="0" smtClean="0"/>
+              <a:t>Projet fini ?</a:t>
+            </a:r>
+          </a:p>
+          <a:p>
+            <a:r>
+              <a:rPr lang="fr-CH" dirty="0" smtClean="0"/>
+              <a:t>Conclusion personnelle</a:t>
+            </a:r>
+            <a:endParaRPr lang="fr-CH" dirty="0"/>
+          </a:p>
+        </p:txBody>
+      </p:sp>
+      <p:sp>
+        <p:nvSpPr>
+          <p:cNvPr id="4" name="Espace réservé de la date 3"/>
+          <p:cNvSpPr>
+            <a:spLocks noGrp="1"/>
+          </p:cNvSpPr>
+          <p:nvPr>
+            <p:ph type="dt" sz="half" idx="10"/>
+          </p:nvPr>
+        </p:nvSpPr>
+        <p:spPr/>
+        <p:txBody>
+          <a:bodyPr/>
+          <a:lstStyle/>
+          <a:p>
+            <a:fld id="{76CC89A8-7949-4A87-9A4F-38279D398AAB}" type="datetime1">
+              <a:rPr lang="fr-CH" smtClean="0"/>
+              <a:t>26.06.2017</a:t>
+            </a:fld>
+            <a:endParaRPr lang="en-US" dirty="0"/>
+          </a:p>
+        </p:txBody>
+      </p:sp>
+      <p:sp>
+        <p:nvSpPr>
+          <p:cNvPr id="5" name="Espace réservé du numéro de diapositive 4"/>
+          <p:cNvSpPr>
+            <a:spLocks noGrp="1"/>
+          </p:cNvSpPr>
+          <p:nvPr>
+            <p:ph type="sldNum" sz="quarter" idx="12"/>
+          </p:nvPr>
+        </p:nvSpPr>
+        <p:spPr/>
+        <p:txBody>
+          <a:bodyPr/>
+          <a:lstStyle/>
+          <a:p>
+            <a:fld id="{519954A3-9DFD-4C44-94BA-B95130A3BA1C}" type="slidenum">
+              <a:rPr lang="en-US" smtClean="0"/>
+              <a:t>20</a:t>
+            </a:fld>
+            <a:r>
+              <a:rPr lang="en-US" dirty="0"/>
+              <a:t>/21</a:t>
+            </a:r>
+            <a:endParaRPr lang="en-US" dirty="0"/>
+          </a:p>
+        </p:txBody>
+      </p:sp>
+      <p:sp>
+        <p:nvSpPr>
+          <p:cNvPr id="8" name="Espace réservé du pied de page 7"/>
+          <p:cNvSpPr>
+            <a:spLocks noGrp="1"/>
+          </p:cNvSpPr>
+          <p:nvPr>
+            <p:ph type="ftr" sz="quarter" idx="11"/>
+          </p:nvPr>
+        </p:nvSpPr>
+        <p:spPr/>
+        <p:txBody>
+          <a:bodyPr/>
+          <a:lstStyle/>
+          <a:p>
+            <a:r>
+              <a:rPr lang="en-US" smtClean="0"/>
+              <a:t>Timothée Guggisberg</a:t>
+            </a:r>
+            <a:endParaRPr lang="en-US" dirty="0"/>
+          </a:p>
+        </p:txBody>
+      </p:sp>
+    </p:spTree>
+    <p:extLst>
+      <p:ext uri="{BB962C8B-B14F-4D97-AF65-F5344CB8AC3E}">
+        <p14:creationId xmlns:p14="http://schemas.microsoft.com/office/powerpoint/2010/main" val="2666547859"/>
+      </p:ext>
+    </p:extLst>
+  </p:cSld>
+  <p:clrMapOvr>
+    <a:masterClrMapping/>
+  </p:clrMapOvr>
+  <p:timing>
+    <p:tnLst>
+      <p:par>
+        <p:cTn id="1" dur="indefinite" restart="never" nodeType="tmRoot"/>
+      </p:par>
+    </p:tnLst>
+  </p:timing>
+</p:sld>
+</file>
+
+<file path=ppt/slides/slide21.xml><?xml version="1.0" encoding="utf-8"?>
+<p:sld xmlns:a="http://schemas.openxmlformats.org/drawingml/2006/main" xmlns:r="http://schemas.openxmlformats.org/officeDocument/2006/relationships" xmlns:p="http://schemas.openxmlformats.org/presentationml/2006/main">
+  <p:cSld>
+    <p:spTree>
+      <p:nvGrpSpPr>
+        <p:cNvPr id="1" name=""/>
+        <p:cNvGrpSpPr/>
+        <p:nvPr/>
+      </p:nvGrpSpPr>
+      <p:grpSpPr>
+        <a:xfrm>
+          <a:off x="0" y="0"/>
+          <a:ext cx="0" cy="0"/>
+          <a:chOff x="0" y="0"/>
+          <a:chExt cx="0" cy="0"/>
+        </a:xfrm>
+      </p:grpSpPr>
+      <p:sp>
+        <p:nvSpPr>
+          <p:cNvPr id="2" name="Titre 1"/>
+          <p:cNvSpPr>
+            <a:spLocks noGrp="1"/>
+          </p:cNvSpPr>
+          <p:nvPr>
+            <p:ph type="title"/>
+          </p:nvPr>
+        </p:nvSpPr>
+        <p:spPr>
+          <a:xfrm>
+            <a:off x="759630" y="2795016"/>
+            <a:ext cx="8596668" cy="1320800"/>
+          </a:xfrm>
+        </p:spPr>
+        <p:txBody>
+          <a:bodyPr>
+            <a:normAutofit/>
+          </a:bodyPr>
+          <a:lstStyle/>
+          <a:p>
+            <a:r>
+              <a:rPr lang="fr-CH" sz="8000" dirty="0" smtClean="0"/>
+              <a:t>Question(s) ?</a:t>
+            </a:r>
+            <a:endParaRPr lang="fr-CH" sz="8000" dirty="0"/>
+          </a:p>
+        </p:txBody>
+      </p:sp>
+      <p:sp>
+        <p:nvSpPr>
+          <p:cNvPr id="3" name="Espace réservé de la date 2"/>
+          <p:cNvSpPr>
+            <a:spLocks noGrp="1"/>
+          </p:cNvSpPr>
+          <p:nvPr>
+            <p:ph type="dt" sz="half" idx="10"/>
+          </p:nvPr>
+        </p:nvSpPr>
+        <p:spPr/>
+        <p:txBody>
+          <a:bodyPr/>
+          <a:lstStyle/>
+          <a:p>
+            <a:fld id="{C70B9732-4AC1-4FE7-AD08-89C0CE4F9BE2}" type="datetime1">
+              <a:rPr lang="fr-CH" smtClean="0"/>
+              <a:t>26.06.2017</a:t>
+            </a:fld>
+            <a:endParaRPr lang="en-US" dirty="0"/>
+          </a:p>
+        </p:txBody>
+      </p:sp>
+      <p:sp>
+        <p:nvSpPr>
+          <p:cNvPr id="4" name="Espace réservé du numéro de diapositive 3"/>
+          <p:cNvSpPr>
+            <a:spLocks noGrp="1"/>
+          </p:cNvSpPr>
+          <p:nvPr>
+            <p:ph type="sldNum" sz="quarter" idx="12"/>
+          </p:nvPr>
+        </p:nvSpPr>
+        <p:spPr/>
+        <p:txBody>
+          <a:bodyPr/>
+          <a:lstStyle/>
+          <a:p>
+            <a:fld id="{D57F1E4F-1CFF-5643-939E-217C01CDF565}" type="slidenum">
+              <a:rPr lang="en-US" smtClean="0"/>
+              <a:pPr/>
+              <a:t>21</a:t>
+            </a:fld>
+            <a:r>
+              <a:rPr lang="en-US" dirty="0" smtClean="0"/>
+              <a:t>/21</a:t>
+            </a:r>
+            <a:endParaRPr lang="en-US" dirty="0"/>
+          </a:p>
+        </p:txBody>
+      </p:sp>
+      <p:sp>
+        <p:nvSpPr>
+          <p:cNvPr id="7" name="Espace réservé du pied de page 6"/>
+          <p:cNvSpPr>
+            <a:spLocks noGrp="1"/>
+          </p:cNvSpPr>
+          <p:nvPr>
+            <p:ph type="ftr" sz="quarter" idx="11"/>
+          </p:nvPr>
+        </p:nvSpPr>
+        <p:spPr>
+          <a:xfrm>
+            <a:off x="2383032" y="6492875"/>
+            <a:ext cx="6297612" cy="365125"/>
+          </a:xfrm>
+        </p:spPr>
+        <p:txBody>
+          <a:bodyPr/>
+          <a:lstStyle/>
+          <a:p>
+            <a:r>
+              <a:rPr lang="en-US" dirty="0" smtClean="0"/>
+              <a:t>Timothée Guggisberg</a:t>
+            </a:r>
+            <a:endParaRPr lang="en-US" dirty="0"/>
+          </a:p>
+        </p:txBody>
+      </p:sp>
+    </p:spTree>
+    <p:extLst>
+      <p:ext uri="{BB962C8B-B14F-4D97-AF65-F5344CB8AC3E}">
+        <p14:creationId xmlns:p14="http://schemas.microsoft.com/office/powerpoint/2010/main" val="2337521776"/>
       </p:ext>
     </p:extLst>
   </p:cSld>
@@ -8432,9 +10220,86 @@
           <a:p>
             <a:r>
               <a:rPr lang="fr-CH" dirty="0" smtClean="0"/>
-              <a:t>Base de données</a:t>
+              <a:t>Base de </a:t>
+            </a:r>
+            <a:r>
+              <a:rPr lang="fr-CH" dirty="0" smtClean="0"/>
+              <a:t>données MySQL</a:t>
             </a:r>
             <a:endParaRPr lang="fr-CH" dirty="0"/>
+          </a:p>
+        </p:txBody>
+      </p:sp>
+      <p:sp>
+        <p:nvSpPr>
+          <p:cNvPr id="4" name="Espace réservé de la date 3"/>
+          <p:cNvSpPr>
+            <a:spLocks noGrp="1"/>
+          </p:cNvSpPr>
+          <p:nvPr>
+            <p:ph type="dt" sz="half" idx="10"/>
+          </p:nvPr>
+        </p:nvSpPr>
+        <p:spPr/>
+        <p:txBody>
+          <a:bodyPr/>
+          <a:lstStyle/>
+          <a:p>
+            <a:fld id="{35A7D55C-413A-45B8-8D27-1DC3393D3F54}" type="datetime1">
+              <a:rPr lang="fr-CH" smtClean="0"/>
+              <a:t>26.06.2017</a:t>
+            </a:fld>
+            <a:endParaRPr lang="en-US" dirty="0"/>
+          </a:p>
+        </p:txBody>
+      </p:sp>
+      <p:sp>
+        <p:nvSpPr>
+          <p:cNvPr id="5" name="Espace réservé du numéro de diapositive 4"/>
+          <p:cNvSpPr>
+            <a:spLocks noGrp="1"/>
+          </p:cNvSpPr>
+          <p:nvPr>
+            <p:ph type="sldNum" sz="quarter" idx="12"/>
+          </p:nvPr>
+        </p:nvSpPr>
+        <p:spPr/>
+        <p:txBody>
+          <a:bodyPr/>
+          <a:lstStyle/>
+          <a:p>
+            <a:fld id="{519954A3-9DFD-4C44-94BA-B95130A3BA1C}" type="slidenum">
+              <a:rPr lang="en-US" smtClean="0"/>
+              <a:t>3</a:t>
+            </a:fld>
+            <a:r>
+              <a:rPr lang="en-US" dirty="0" smtClean="0"/>
+              <a:t>/21</a:t>
+            </a:r>
+            <a:endParaRPr lang="en-US" dirty="0"/>
+          </a:p>
+        </p:txBody>
+      </p:sp>
+      <p:sp>
+        <p:nvSpPr>
+          <p:cNvPr id="8" name="Espace réservé du pied de page 7"/>
+          <p:cNvSpPr>
+            <a:spLocks noGrp="1"/>
+          </p:cNvSpPr>
+          <p:nvPr>
+            <p:ph type="ftr" sz="quarter" idx="11"/>
+          </p:nvPr>
+        </p:nvSpPr>
+        <p:spPr/>
+        <p:txBody>
+          <a:bodyPr/>
+          <a:lstStyle/>
+          <a:p>
+            <a:r>
+              <a:rPr lang="en-US" smtClean="0"/>
+              <a:t>Timothée Guggisberg</a:t>
+            </a:r>
+            <a:endParaRPr lang="en-US" dirty="0"/>
           </a:p>
         </p:txBody>
       </p:sp>
@@ -8555,6 +10420,79 @@
           </a:prstGeom>
         </p:spPr>
       </p:pic>
+      <p:sp>
+        <p:nvSpPr>
+          <p:cNvPr id="5" name="Espace réservé de la date 4"/>
+          <p:cNvSpPr>
+            <a:spLocks noGrp="1"/>
+          </p:cNvSpPr>
+          <p:nvPr>
+            <p:ph type="dt" sz="half" idx="10"/>
+          </p:nvPr>
+        </p:nvSpPr>
+        <p:spPr/>
+        <p:txBody>
+          <a:bodyPr/>
+          <a:lstStyle/>
+          <a:p>
+            <a:fld id="{B1B5B104-0FA4-4AC0-9AB8-004A2BF58246}" type="datetime1">
+              <a:rPr lang="fr-CH" smtClean="0"/>
+              <a:t>26.06.2017</a:t>
+            </a:fld>
+            <a:endParaRPr lang="en-US" dirty="0"/>
+          </a:p>
+        </p:txBody>
+      </p:sp>
+      <p:sp>
+        <p:nvSpPr>
+          <p:cNvPr id="6" name="Espace réservé du numéro de diapositive 5"/>
+          <p:cNvSpPr>
+            <a:spLocks noGrp="1"/>
+          </p:cNvSpPr>
+          <p:nvPr>
+            <p:ph type="sldNum" sz="quarter" idx="12"/>
+          </p:nvPr>
+        </p:nvSpPr>
+        <p:spPr/>
+        <p:txBody>
+          <a:bodyPr/>
+          <a:lstStyle/>
+          <a:p>
+            <a:fld id="{519954A3-9DFD-4C44-94BA-B95130A3BA1C}" type="slidenum">
+              <a:rPr lang="en-US" smtClean="0"/>
+              <a:t>4</a:t>
+            </a:fld>
+            <a:r>
+              <a:rPr lang="en-US" dirty="0" smtClean="0"/>
+              <a:t>/21</a:t>
+            </a:r>
+            <a:endParaRPr lang="en-US" dirty="0"/>
+          </a:p>
+        </p:txBody>
+      </p:sp>
+      <p:sp>
+        <p:nvSpPr>
+          <p:cNvPr id="9" name="Espace réservé du pied de page 8"/>
+          <p:cNvSpPr>
+            <a:spLocks noGrp="1"/>
+          </p:cNvSpPr>
+          <p:nvPr>
+            <p:ph type="ftr" sz="quarter" idx="11"/>
+          </p:nvPr>
+        </p:nvSpPr>
+        <p:spPr/>
+        <p:txBody>
+          <a:bodyPr/>
+          <a:lstStyle/>
+          <a:p>
+            <a:r>
+              <a:rPr lang="en-US" smtClean="0"/>
+              <a:t>Timothée Guggisberg</a:t>
+            </a:r>
+            <a:endParaRPr lang="en-US" dirty="0"/>
+          </a:p>
+        </p:txBody>
+      </p:sp>
     </p:spTree>
     <p:extLst>
       <p:ext uri="{BB962C8B-B14F-4D97-AF65-F5344CB8AC3E}">
@@ -8825,7 +10763,11 @@
             <a:pPr algn="ctr"/>
             <a:r>
               <a:rPr lang="fr-CH" sz="1600" dirty="0" smtClean="0"/>
-              <a:t>Base de donnée</a:t>
+              <a:t>Base de </a:t>
+            </a:r>
+            <a:r>
+              <a:rPr lang="fr-CH" sz="1600" dirty="0" smtClean="0"/>
+              <a:t>données</a:t>
             </a:r>
             <a:endParaRPr lang="fr-CH" sz="1600" dirty="0"/>
           </a:p>
@@ -9288,6 +11230,79 @@
                 <a:schemeClr val="tx1"/>
               </a:solidFill>
             </a:endParaRPr>
+          </a:p>
+        </p:txBody>
+      </p:sp>
+      <p:sp>
+        <p:nvSpPr>
+          <p:cNvPr id="3" name="Espace réservé de la date 2"/>
+          <p:cNvSpPr>
+            <a:spLocks noGrp="1"/>
+          </p:cNvSpPr>
+          <p:nvPr>
+            <p:ph type="dt" sz="half" idx="10"/>
+          </p:nvPr>
+        </p:nvSpPr>
+        <p:spPr/>
+        <p:txBody>
+          <a:bodyPr/>
+          <a:lstStyle/>
+          <a:p>
+            <a:fld id="{EE5F3BF8-4916-49B3-9ECB-1B1AC80FD1A4}" type="datetime1">
+              <a:rPr lang="fr-CH" smtClean="0"/>
+              <a:t>26.06.2017</a:t>
+            </a:fld>
+            <a:endParaRPr lang="en-US" dirty="0"/>
+          </a:p>
+        </p:txBody>
+      </p:sp>
+      <p:sp>
+        <p:nvSpPr>
+          <p:cNvPr id="13" name="Espace réservé du numéro de diapositive 12"/>
+          <p:cNvSpPr>
+            <a:spLocks noGrp="1"/>
+          </p:cNvSpPr>
+          <p:nvPr>
+            <p:ph type="sldNum" sz="quarter" idx="12"/>
+          </p:nvPr>
+        </p:nvSpPr>
+        <p:spPr/>
+        <p:txBody>
+          <a:bodyPr/>
+          <a:lstStyle/>
+          <a:p>
+            <a:fld id="{519954A3-9DFD-4C44-94BA-B95130A3BA1C}" type="slidenum">
+              <a:rPr lang="en-US" smtClean="0"/>
+              <a:t>5</a:t>
+            </a:fld>
+            <a:r>
+              <a:rPr lang="en-US" dirty="0" smtClean="0"/>
+              <a:t>/21</a:t>
+            </a:r>
+            <a:endParaRPr lang="en-US" dirty="0"/>
+          </a:p>
+        </p:txBody>
+      </p:sp>
+      <p:sp>
+        <p:nvSpPr>
+          <p:cNvPr id="16" name="Espace réservé du pied de page 15"/>
+          <p:cNvSpPr>
+            <a:spLocks noGrp="1"/>
+          </p:cNvSpPr>
+          <p:nvPr>
+            <p:ph type="ftr" sz="quarter" idx="11"/>
+          </p:nvPr>
+        </p:nvSpPr>
+        <p:spPr/>
+        <p:txBody>
+          <a:bodyPr/>
+          <a:lstStyle/>
+          <a:p>
+            <a:r>
+              <a:rPr lang="en-US" smtClean="0"/>
+              <a:t>Timothée Guggisberg</a:t>
+            </a:r>
+            <a:endParaRPr lang="en-US" dirty="0"/>
           </a:p>
         </p:txBody>
       </p:sp>
@@ -9401,6 +11416,79 @@
           </a:p>
         </p:txBody>
       </p:sp>
+      <p:sp>
+        <p:nvSpPr>
+          <p:cNvPr id="4" name="Espace réservé de la date 3"/>
+          <p:cNvSpPr>
+            <a:spLocks noGrp="1"/>
+          </p:cNvSpPr>
+          <p:nvPr>
+            <p:ph type="dt" sz="half" idx="10"/>
+          </p:nvPr>
+        </p:nvSpPr>
+        <p:spPr/>
+        <p:txBody>
+          <a:bodyPr/>
+          <a:lstStyle/>
+          <a:p>
+            <a:fld id="{4D8BE0C6-474D-421C-91F0-65A4C997AF81}" type="datetime1">
+              <a:rPr lang="fr-CH" smtClean="0"/>
+              <a:t>26.06.2017</a:t>
+            </a:fld>
+            <a:endParaRPr lang="en-US" dirty="0"/>
+          </a:p>
+        </p:txBody>
+      </p:sp>
+      <p:sp>
+        <p:nvSpPr>
+          <p:cNvPr id="5" name="Espace réservé du numéro de diapositive 4"/>
+          <p:cNvSpPr>
+            <a:spLocks noGrp="1"/>
+          </p:cNvSpPr>
+          <p:nvPr>
+            <p:ph type="sldNum" sz="quarter" idx="12"/>
+          </p:nvPr>
+        </p:nvSpPr>
+        <p:spPr/>
+        <p:txBody>
+          <a:bodyPr/>
+          <a:lstStyle/>
+          <a:p>
+            <a:fld id="{519954A3-9DFD-4C44-94BA-B95130A3BA1C}" type="slidenum">
+              <a:rPr lang="en-US" smtClean="0"/>
+              <a:t>6</a:t>
+            </a:fld>
+            <a:r>
+              <a:rPr lang="en-US" dirty="0" smtClean="0"/>
+              <a:t>/21</a:t>
+            </a:r>
+            <a:endParaRPr lang="en-US" dirty="0"/>
+          </a:p>
+        </p:txBody>
+      </p:sp>
+      <p:sp>
+        <p:nvSpPr>
+          <p:cNvPr id="8" name="Espace réservé du pied de page 7"/>
+          <p:cNvSpPr>
+            <a:spLocks noGrp="1"/>
+          </p:cNvSpPr>
+          <p:nvPr>
+            <p:ph type="ftr" sz="quarter" idx="11"/>
+          </p:nvPr>
+        </p:nvSpPr>
+        <p:spPr/>
+        <p:txBody>
+          <a:bodyPr/>
+          <a:lstStyle/>
+          <a:p>
+            <a:r>
+              <a:rPr lang="en-US" smtClean="0"/>
+              <a:t>Timothée Guggisberg</a:t>
+            </a:r>
+            <a:endParaRPr lang="en-US" dirty="0"/>
+          </a:p>
+        </p:txBody>
+      </p:sp>
     </p:spTree>
     <p:extLst>
       <p:ext uri="{BB962C8B-B14F-4D97-AF65-F5344CB8AC3E}">
@@ -9494,6 +11582,79 @@
           </a:ln>
         </p:spPr>
       </p:pic>
+      <p:sp>
+        <p:nvSpPr>
+          <p:cNvPr id="3" name="Espace réservé de la date 2"/>
+          <p:cNvSpPr>
+            <a:spLocks noGrp="1"/>
+          </p:cNvSpPr>
+          <p:nvPr>
+            <p:ph type="dt" sz="half" idx="10"/>
+          </p:nvPr>
+        </p:nvSpPr>
+        <p:spPr/>
+        <p:txBody>
+          <a:bodyPr/>
+          <a:lstStyle/>
+          <a:p>
+            <a:fld id="{536ECAF7-8D8A-40C5-BC56-143ED4A6337B}" type="datetime1">
+              <a:rPr lang="fr-CH" smtClean="0"/>
+              <a:t>26.06.2017</a:t>
+            </a:fld>
+            <a:endParaRPr lang="en-US" dirty="0"/>
+          </a:p>
+        </p:txBody>
+      </p:sp>
+      <p:sp>
+        <p:nvSpPr>
+          <p:cNvPr id="5" name="Espace réservé du numéro de diapositive 4"/>
+          <p:cNvSpPr>
+            <a:spLocks noGrp="1"/>
+          </p:cNvSpPr>
+          <p:nvPr>
+            <p:ph type="sldNum" sz="quarter" idx="12"/>
+          </p:nvPr>
+        </p:nvSpPr>
+        <p:spPr/>
+        <p:txBody>
+          <a:bodyPr/>
+          <a:lstStyle/>
+          <a:p>
+            <a:fld id="{519954A3-9DFD-4C44-94BA-B95130A3BA1C}" type="slidenum">
+              <a:rPr lang="en-US" smtClean="0"/>
+              <a:t>7</a:t>
+            </a:fld>
+            <a:r>
+              <a:rPr lang="en-US" dirty="0" smtClean="0"/>
+              <a:t>/21</a:t>
+            </a:r>
+            <a:endParaRPr lang="en-US" dirty="0"/>
+          </a:p>
+        </p:txBody>
+      </p:sp>
+      <p:sp>
+        <p:nvSpPr>
+          <p:cNvPr id="8" name="Espace réservé du pied de page 7"/>
+          <p:cNvSpPr>
+            <a:spLocks noGrp="1"/>
+          </p:cNvSpPr>
+          <p:nvPr>
+            <p:ph type="ftr" sz="quarter" idx="11"/>
+          </p:nvPr>
+        </p:nvSpPr>
+        <p:spPr/>
+        <p:txBody>
+          <a:bodyPr/>
+          <a:lstStyle/>
+          <a:p>
+            <a:r>
+              <a:rPr lang="en-US" smtClean="0"/>
+              <a:t>Timothée Guggisberg</a:t>
+            </a:r>
+            <a:endParaRPr lang="en-US" dirty="0"/>
+          </a:p>
+        </p:txBody>
+      </p:sp>
     </p:spTree>
     <p:extLst>
       <p:ext uri="{BB962C8B-B14F-4D97-AF65-F5344CB8AC3E}">
@@ -9586,6 +11747,79 @@
           </a:ln>
         </p:spPr>
       </p:pic>
+      <p:sp>
+        <p:nvSpPr>
+          <p:cNvPr id="3" name="Espace réservé de la date 2"/>
+          <p:cNvSpPr>
+            <a:spLocks noGrp="1"/>
+          </p:cNvSpPr>
+          <p:nvPr>
+            <p:ph type="dt" sz="half" idx="10"/>
+          </p:nvPr>
+        </p:nvSpPr>
+        <p:spPr/>
+        <p:txBody>
+          <a:bodyPr/>
+          <a:lstStyle/>
+          <a:p>
+            <a:fld id="{CF9B088B-C4B3-4181-8665-9D74C1579CEE}" type="datetime1">
+              <a:rPr lang="fr-CH" smtClean="0"/>
+              <a:t>26.06.2017</a:t>
+            </a:fld>
+            <a:endParaRPr lang="en-US" dirty="0"/>
+          </a:p>
+        </p:txBody>
+      </p:sp>
+      <p:sp>
+        <p:nvSpPr>
+          <p:cNvPr id="5" name="Espace réservé du numéro de diapositive 4"/>
+          <p:cNvSpPr>
+            <a:spLocks noGrp="1"/>
+          </p:cNvSpPr>
+          <p:nvPr>
+            <p:ph type="sldNum" sz="quarter" idx="12"/>
+          </p:nvPr>
+        </p:nvSpPr>
+        <p:spPr/>
+        <p:txBody>
+          <a:bodyPr/>
+          <a:lstStyle/>
+          <a:p>
+            <a:fld id="{519954A3-9DFD-4C44-94BA-B95130A3BA1C}" type="slidenum">
+              <a:rPr lang="en-US" smtClean="0"/>
+              <a:t>8</a:t>
+            </a:fld>
+            <a:r>
+              <a:rPr lang="en-US" dirty="0" smtClean="0"/>
+              <a:t>/21</a:t>
+            </a:r>
+            <a:endParaRPr lang="en-US" dirty="0"/>
+          </a:p>
+        </p:txBody>
+      </p:sp>
+      <p:sp>
+        <p:nvSpPr>
+          <p:cNvPr id="8" name="Espace réservé du pied de page 7"/>
+          <p:cNvSpPr>
+            <a:spLocks noGrp="1"/>
+          </p:cNvSpPr>
+          <p:nvPr>
+            <p:ph type="ftr" sz="quarter" idx="11"/>
+          </p:nvPr>
+        </p:nvSpPr>
+        <p:spPr/>
+        <p:txBody>
+          <a:bodyPr/>
+          <a:lstStyle/>
+          <a:p>
+            <a:r>
+              <a:rPr lang="en-US" smtClean="0"/>
+              <a:t>Timothée Guggisberg</a:t>
+            </a:r>
+            <a:endParaRPr lang="en-US" dirty="0"/>
+          </a:p>
+        </p:txBody>
+      </p:sp>
     </p:spTree>
     <p:extLst>
       <p:ext uri="{BB962C8B-B14F-4D97-AF65-F5344CB8AC3E}">
@@ -9679,6 +11913,79 @@
           </a:ln>
         </p:spPr>
       </p:pic>
+      <p:sp>
+        <p:nvSpPr>
+          <p:cNvPr id="3" name="Espace réservé de la date 2"/>
+          <p:cNvSpPr>
+            <a:spLocks noGrp="1"/>
+          </p:cNvSpPr>
+          <p:nvPr>
+            <p:ph type="dt" sz="half" idx="10"/>
+          </p:nvPr>
+        </p:nvSpPr>
+        <p:spPr/>
+        <p:txBody>
+          <a:bodyPr/>
+          <a:lstStyle/>
+          <a:p>
+            <a:fld id="{1B4A9E55-4662-47C8-B74E-EC5D19E7DEE1}" type="datetime1">
+              <a:rPr lang="fr-CH" smtClean="0"/>
+              <a:t>26.06.2017</a:t>
+            </a:fld>
+            <a:endParaRPr lang="en-US" dirty="0"/>
+          </a:p>
+        </p:txBody>
+      </p:sp>
+      <p:sp>
+        <p:nvSpPr>
+          <p:cNvPr id="5" name="Espace réservé du numéro de diapositive 4"/>
+          <p:cNvSpPr>
+            <a:spLocks noGrp="1"/>
+          </p:cNvSpPr>
+          <p:nvPr>
+            <p:ph type="sldNum" sz="quarter" idx="12"/>
+          </p:nvPr>
+        </p:nvSpPr>
+        <p:spPr/>
+        <p:txBody>
+          <a:bodyPr/>
+          <a:lstStyle/>
+          <a:p>
+            <a:fld id="{519954A3-9DFD-4C44-94BA-B95130A3BA1C}" type="slidenum">
+              <a:rPr lang="en-US" smtClean="0"/>
+              <a:t>9</a:t>
+            </a:fld>
+            <a:r>
+              <a:rPr lang="en-US" dirty="0" smtClean="0"/>
+              <a:t>/21</a:t>
+            </a:r>
+            <a:endParaRPr lang="en-US" dirty="0"/>
+          </a:p>
+        </p:txBody>
+      </p:sp>
+      <p:sp>
+        <p:nvSpPr>
+          <p:cNvPr id="8" name="Espace réservé du pied de page 7"/>
+          <p:cNvSpPr>
+            <a:spLocks noGrp="1"/>
+          </p:cNvSpPr>
+          <p:nvPr>
+            <p:ph type="ftr" sz="quarter" idx="11"/>
+          </p:nvPr>
+        </p:nvSpPr>
+        <p:spPr/>
+        <p:txBody>
+          <a:bodyPr/>
+          <a:lstStyle/>
+          <a:p>
+            <a:r>
+              <a:rPr lang="en-US" smtClean="0"/>
+              <a:t>Timothée Guggisberg</a:t>
+            </a:r>
+            <a:endParaRPr lang="en-US" dirty="0"/>
+          </a:p>
+        </p:txBody>
+      </p:sp>
     </p:spTree>
     <p:extLst>
       <p:ext uri="{BB962C8B-B14F-4D97-AF65-F5344CB8AC3E}">

</xml_diff>

<commit_message>
HotFix de la présentation
</commit_message>
<xml_diff>
--- a/Documentation/Projet DemoMot.pptx
+++ b/Documentation/Projet DemoMot.pptx
@@ -1347,11 +1347,7 @@
             </a:r>
             <a:r>
               <a:rPr lang="fr-CH" smtClean="0"/>
-              <a:t>vue </a:t>
-            </a:r>
-            <a:r>
-              <a:rPr lang="fr-CH" smtClean="0"/>
-              <a:t>exterieur</a:t>
+              <a:t>vue exterieur</a:t>
             </a:r>
             <a:r>
               <a:rPr lang="fr-CH" baseline="0" smtClean="0"/>
@@ -7923,13 +7919,8 @@
           <a:p>
             <a:r>
               <a:rPr lang="fr-CH" dirty="0" smtClean="0"/>
-              <a:t>5 </a:t>
-            </a:r>
-            <a:r>
-              <a:rPr lang="fr-CH" dirty="0" smtClean="0"/>
-              <a:t>Formulaires</a:t>
-            </a:r>
-            <a:endParaRPr lang="fr-CH" dirty="0" smtClean="0"/>
+              <a:t>5 Formulaires</a:t>
+            </a:r>
           </a:p>
           <a:p>
             <a:pPr lvl="1"/>
@@ -8558,15 +8549,7 @@
           <a:p>
             <a:r>
               <a:rPr lang="fr-CH" dirty="0" smtClean="0"/>
-              <a:t>Démo à </a:t>
-            </a:r>
-            <a:r>
-              <a:rPr lang="fr-CH" dirty="0" smtClean="0"/>
-              <a:t>d’autres </a:t>
-            </a:r>
-            <a:r>
-              <a:rPr lang="fr-CH" dirty="0" smtClean="0"/>
-              <a:t>personnes</a:t>
+              <a:t>Démo à d’autres personnes</a:t>
             </a:r>
           </a:p>
           <a:p>
@@ -8744,11 +8727,7 @@
           <a:p>
             <a:r>
               <a:rPr lang="fr-CH" dirty="0" smtClean="0"/>
-              <a:t>Bug : Présentation du </a:t>
-            </a:r>
-            <a:r>
-              <a:rPr lang="fr-CH" dirty="0" smtClean="0"/>
-              <a:t>chalet</a:t>
+              <a:t>Bug : Présentation du chalet</a:t>
             </a:r>
           </a:p>
           <a:p>
@@ -8938,7 +8917,6 @@
               <a:rPr lang="en-US" dirty="0"/>
               <a:t>/21</a:t>
             </a:r>
-            <a:endParaRPr lang="en-US" dirty="0"/>
           </a:p>
         </p:txBody>
       </p:sp>
@@ -9078,7 +9056,6 @@
               <a:rPr lang="en-US" dirty="0"/>
               <a:t>/21</a:t>
             </a:r>
-            <a:endParaRPr lang="en-US" dirty="0"/>
           </a:p>
         </p:txBody>
       </p:sp>
@@ -9715,8 +9692,19 @@
           <a:p>
             <a:r>
               <a:rPr lang="fr-CH" dirty="0" smtClean="0"/>
-              <a:t>Problèmes rencontrés</a:t>
-            </a:r>
+              <a:t>Problèmes </a:t>
+            </a:r>
+            <a:r>
+              <a:rPr lang="fr-CH" dirty="0" smtClean="0"/>
+              <a:t>rencontrés</a:t>
+            </a:r>
+          </a:p>
+          <a:p>
+            <a:r>
+              <a:rPr lang="fr-CH" dirty="0" smtClean="0"/>
+              <a:t>Journal de travail</a:t>
+            </a:r>
+            <a:endParaRPr lang="fr-CH" dirty="0" smtClean="0"/>
           </a:p>
           <a:p>
             <a:r>
@@ -9947,7 +9935,6 @@
               <a:rPr lang="en-US" dirty="0"/>
               <a:t>/21</a:t>
             </a:r>
-            <a:endParaRPr lang="en-US" dirty="0"/>
           </a:p>
         </p:txBody>
       </p:sp>
@@ -10220,11 +10207,7 @@
           <a:p>
             <a:r>
               <a:rPr lang="fr-CH" dirty="0" smtClean="0"/>
-              <a:t>Base de </a:t>
-            </a:r>
-            <a:r>
-              <a:rPr lang="fr-CH" dirty="0" smtClean="0"/>
-              <a:t>données MySQL</a:t>
+              <a:t>Base de données MySQL</a:t>
             </a:r>
             <a:endParaRPr lang="fr-CH" dirty="0"/>
           </a:p>
@@ -10763,11 +10746,7 @@
             <a:pPr algn="ctr"/>
             <a:r>
               <a:rPr lang="fr-CH" sz="1600" dirty="0" smtClean="0"/>
-              <a:t>Base de </a:t>
-            </a:r>
-            <a:r>
-              <a:rPr lang="fr-CH" sz="1600" dirty="0" smtClean="0"/>
-              <a:t>données</a:t>
+              <a:t>Base de données</a:t>
             </a:r>
             <a:endParaRPr lang="fr-CH" sz="1600" dirty="0"/>
           </a:p>

</xml_diff>